<commit_message>
finish working with s3 buckets and objects basics
</commit_message>
<xml_diff>
--- a/AWS/source/S3/S3BucketsObjects.pptx
+++ b/AWS/source/S3/S3BucketsObjects.pptx
@@ -10,6 +10,18 @@
     <p:sldId id="259" r:id="rId4"/>
     <p:sldId id="257" r:id="rId5"/>
     <p:sldId id="260" r:id="rId6"/>
+    <p:sldId id="261" r:id="rId7"/>
+    <p:sldId id="262" r:id="rId8"/>
+    <p:sldId id="264" r:id="rId9"/>
+    <p:sldId id="263" r:id="rId10"/>
+    <p:sldId id="265" r:id="rId11"/>
+    <p:sldId id="266" r:id="rId12"/>
+    <p:sldId id="268" r:id="rId13"/>
+    <p:sldId id="267" r:id="rId14"/>
+    <p:sldId id="269" r:id="rId15"/>
+    <p:sldId id="270" r:id="rId16"/>
+    <p:sldId id="271" r:id="rId17"/>
+    <p:sldId id="272" r:id="rId18"/>
   </p:sldIdLst>
   <p:sldSz cx="12192000" cy="6858000"/>
   <p:notesSz cx="6858000" cy="9144000"/>
@@ -108,6 +120,11 @@
       </a:defRPr>
     </a:lvl9pPr>
   </p:defaultTextStyle>
+  <p:extLst>
+    <p:ext uri="{EFAFB233-063F-42B5-8137-9DF3F51BA10A}">
+      <p15:sldGuideLst xmlns:p15="http://schemas.microsoft.com/office/powerpoint/2012/main"/>
+    </p:ext>
+  </p:extLst>
 </p:presentation>
 </file>
 
@@ -260,7 +277,7 @@
           <a:p>
             <a:fld id="{84642339-C2AB-F943-ACC5-8EAF71ADA5E3}" type="datetimeFigureOut">
               <a:rPr lang="en-US" smtClean="0"/>
-              <a:t>9/15/24</a:t>
+              <a:t>9/22/24</a:t>
             </a:fld>
             <a:endParaRPr lang="en-US"/>
           </a:p>
@@ -460,7 +477,7 @@
           <a:p>
             <a:fld id="{84642339-C2AB-F943-ACC5-8EAF71ADA5E3}" type="datetimeFigureOut">
               <a:rPr lang="en-US" smtClean="0"/>
-              <a:t>9/15/24</a:t>
+              <a:t>9/22/24</a:t>
             </a:fld>
             <a:endParaRPr lang="en-US"/>
           </a:p>
@@ -670,7 +687,7 @@
           <a:p>
             <a:fld id="{84642339-C2AB-F943-ACC5-8EAF71ADA5E3}" type="datetimeFigureOut">
               <a:rPr lang="en-US" smtClean="0"/>
-              <a:t>9/15/24</a:t>
+              <a:t>9/22/24</a:t>
             </a:fld>
             <a:endParaRPr lang="en-US"/>
           </a:p>
@@ -870,7 +887,7 @@
           <a:p>
             <a:fld id="{84642339-C2AB-F943-ACC5-8EAF71ADA5E3}" type="datetimeFigureOut">
               <a:rPr lang="en-US" smtClean="0"/>
-              <a:t>9/15/24</a:t>
+              <a:t>9/22/24</a:t>
             </a:fld>
             <a:endParaRPr lang="en-US"/>
           </a:p>
@@ -1146,7 +1163,7 @@
           <a:p>
             <a:fld id="{84642339-C2AB-F943-ACC5-8EAF71ADA5E3}" type="datetimeFigureOut">
               <a:rPr lang="en-US" smtClean="0"/>
-              <a:t>9/15/24</a:t>
+              <a:t>9/22/24</a:t>
             </a:fld>
             <a:endParaRPr lang="en-US"/>
           </a:p>
@@ -1414,7 +1431,7 @@
           <a:p>
             <a:fld id="{84642339-C2AB-F943-ACC5-8EAF71ADA5E3}" type="datetimeFigureOut">
               <a:rPr lang="en-US" smtClean="0"/>
-              <a:t>9/15/24</a:t>
+              <a:t>9/22/24</a:t>
             </a:fld>
             <a:endParaRPr lang="en-US"/>
           </a:p>
@@ -1829,7 +1846,7 @@
           <a:p>
             <a:fld id="{84642339-C2AB-F943-ACC5-8EAF71ADA5E3}" type="datetimeFigureOut">
               <a:rPr lang="en-US" smtClean="0"/>
-              <a:t>9/15/24</a:t>
+              <a:t>9/22/24</a:t>
             </a:fld>
             <a:endParaRPr lang="en-US"/>
           </a:p>
@@ -1971,7 +1988,7 @@
           <a:p>
             <a:fld id="{84642339-C2AB-F943-ACC5-8EAF71ADA5E3}" type="datetimeFigureOut">
               <a:rPr lang="en-US" smtClean="0"/>
-              <a:t>9/15/24</a:t>
+              <a:t>9/22/24</a:t>
             </a:fld>
             <a:endParaRPr lang="en-US"/>
           </a:p>
@@ -2084,7 +2101,7 @@
           <a:p>
             <a:fld id="{84642339-C2AB-F943-ACC5-8EAF71ADA5E3}" type="datetimeFigureOut">
               <a:rPr lang="en-US" smtClean="0"/>
-              <a:t>9/15/24</a:t>
+              <a:t>9/22/24</a:t>
             </a:fld>
             <a:endParaRPr lang="en-US"/>
           </a:p>
@@ -2397,7 +2414,7 @@
           <a:p>
             <a:fld id="{84642339-C2AB-F943-ACC5-8EAF71ADA5E3}" type="datetimeFigureOut">
               <a:rPr lang="en-US" smtClean="0"/>
-              <a:t>9/15/24</a:t>
+              <a:t>9/22/24</a:t>
             </a:fld>
             <a:endParaRPr lang="en-US"/>
           </a:p>
@@ -2686,7 +2703,7 @@
           <a:p>
             <a:fld id="{84642339-C2AB-F943-ACC5-8EAF71ADA5E3}" type="datetimeFigureOut">
               <a:rPr lang="en-US" smtClean="0"/>
-              <a:t>9/15/24</a:t>
+              <a:t>9/22/24</a:t>
             </a:fld>
             <a:endParaRPr lang="en-US"/>
           </a:p>
@@ -2929,7 +2946,7 @@
           <a:p>
             <a:fld id="{84642339-C2AB-F943-ACC5-8EAF71ADA5E3}" type="datetimeFigureOut">
               <a:rPr lang="en-US" smtClean="0"/>
-              <a:t>9/15/24</a:t>
+              <a:t>9/22/24</a:t>
             </a:fld>
             <a:endParaRPr lang="en-US"/>
           </a:p>
@@ -3412,6 +3429,2034 @@
 </p:sld>
 </file>
 
+<file path=ppt/slides/slide10.xml><?xml version="1.0" encoding="utf-8"?>
+<p:sld xmlns:a="http://schemas.openxmlformats.org/drawingml/2006/main" xmlns:r="http://schemas.openxmlformats.org/officeDocument/2006/relationships" xmlns:p="http://schemas.openxmlformats.org/presentationml/2006/main">
+  <p:cSld>
+    <p:spTree>
+      <p:nvGrpSpPr>
+        <p:cNvPr id="1" name=""/>
+        <p:cNvGrpSpPr/>
+        <p:nvPr/>
+      </p:nvGrpSpPr>
+      <p:grpSpPr>
+        <a:xfrm>
+          <a:off x="0" y="0"/>
+          <a:ext cx="0" cy="0"/>
+          <a:chOff x="0" y="0"/>
+          <a:chExt cx="0" cy="0"/>
+        </a:xfrm>
+      </p:grpSpPr>
+      <p:sp>
+        <p:nvSpPr>
+          <p:cNvPr id="2" name="Title 1">
+            <a:extLst>
+              <a:ext uri="{FF2B5EF4-FFF2-40B4-BE49-F238E27FC236}">
+                <a16:creationId xmlns:a16="http://schemas.microsoft.com/office/drawing/2014/main" id="{B0BA1E47-A378-3175-9BE1-D35DC694EF09}"/>
+              </a:ext>
+            </a:extLst>
+          </p:cNvPr>
+          <p:cNvSpPr>
+            <a:spLocks noGrp="1"/>
+          </p:cNvSpPr>
+          <p:nvPr>
+            <p:ph type="title"/>
+          </p:nvPr>
+        </p:nvSpPr>
+        <p:spPr/>
+        <p:txBody>
+          <a:bodyPr/>
+          <a:lstStyle/>
+          <a:p>
+            <a:r>
+              <a:rPr lang="en-US" dirty="0"/>
+              <a:t>Upload Object 2</a:t>
+            </a:r>
+          </a:p>
+        </p:txBody>
+      </p:sp>
+      <p:sp>
+        <p:nvSpPr>
+          <p:cNvPr id="3" name="Content Placeholder 2">
+            <a:extLst>
+              <a:ext uri="{FF2B5EF4-FFF2-40B4-BE49-F238E27FC236}">
+                <a16:creationId xmlns:a16="http://schemas.microsoft.com/office/drawing/2014/main" id="{3A2575B9-D19E-342F-0C11-4A8ED8E58BA5}"/>
+              </a:ext>
+            </a:extLst>
+          </p:cNvPr>
+          <p:cNvSpPr>
+            <a:spLocks noGrp="1"/>
+          </p:cNvSpPr>
+          <p:nvPr>
+            <p:ph idx="1"/>
+          </p:nvPr>
+        </p:nvSpPr>
+        <p:spPr>
+          <a:xfrm>
+            <a:off x="6096000" y="1507242"/>
+            <a:ext cx="5257800" cy="5212057"/>
+          </a:xfrm>
+        </p:spPr>
+        <p:txBody>
+          <a:bodyPr>
+            <a:normAutofit/>
+          </a:bodyPr>
+          <a:lstStyle/>
+          <a:p>
+            <a:r>
+              <a:rPr lang="en-US" dirty="0" err="1">
+                <a:latin typeface="+mn-ea"/>
+              </a:rPr>
+              <a:t>進入</a:t>
+            </a:r>
+            <a:r>
+              <a:rPr lang="zh-TW" altLang="en-US" dirty="0">
+                <a:latin typeface="+mn-ea"/>
+              </a:rPr>
+              <a:t> </a:t>
+            </a:r>
+            <a:r>
+              <a:rPr lang="en-US" altLang="zh-TW" dirty="0">
+                <a:latin typeface="+mn-ea"/>
+              </a:rPr>
+              <a:t>U</a:t>
+            </a:r>
+            <a:r>
+              <a:rPr lang="en-US" dirty="0">
+                <a:latin typeface="+mn-ea"/>
+              </a:rPr>
+              <a:t>pload panel</a:t>
+            </a:r>
+            <a:endParaRPr lang="en-GB" dirty="0">
+              <a:latin typeface="+mn-ea"/>
+            </a:endParaRPr>
+          </a:p>
+          <a:p>
+            <a:r>
+              <a:rPr lang="en-US" dirty="0" err="1">
+                <a:latin typeface="+mn-ea"/>
+              </a:rPr>
+              <a:t>點擊</a:t>
+            </a:r>
+            <a:r>
+              <a:rPr lang="zh-TW" altLang="en-US" dirty="0">
+                <a:latin typeface="+mn-ea"/>
+              </a:rPr>
+              <a:t> </a:t>
+            </a:r>
+            <a:r>
+              <a:rPr lang="en-US" altLang="zh-TW" dirty="0">
+                <a:solidFill>
+                  <a:srgbClr val="FF0000"/>
+                </a:solidFill>
+                <a:latin typeface="+mn-ea"/>
+              </a:rPr>
+              <a:t>Add files </a:t>
+            </a:r>
+            <a:r>
+              <a:rPr lang="en-US" altLang="zh-TW" dirty="0">
+                <a:latin typeface="+mn-ea"/>
+              </a:rPr>
+              <a:t>/ </a:t>
+            </a:r>
+            <a:r>
+              <a:rPr lang="en-US" altLang="zh-TW" dirty="0">
+                <a:solidFill>
+                  <a:srgbClr val="FF0000"/>
+                </a:solidFill>
+                <a:latin typeface="+mn-ea"/>
+              </a:rPr>
+              <a:t>Add folder</a:t>
+            </a:r>
+            <a:r>
+              <a:rPr lang="zh-TW" altLang="en-US" dirty="0">
+                <a:latin typeface="+mn-ea"/>
+              </a:rPr>
+              <a:t>，選擇上傳 檔案 </a:t>
+            </a:r>
+            <a:r>
+              <a:rPr lang="en-US" altLang="zh-TW" dirty="0">
+                <a:latin typeface="+mn-ea"/>
+              </a:rPr>
+              <a:t>/</a:t>
+            </a:r>
+            <a:r>
+              <a:rPr lang="zh-TW" altLang="en-US" dirty="0">
+                <a:latin typeface="+mn-ea"/>
+              </a:rPr>
+              <a:t> 資料夾</a:t>
+            </a:r>
+            <a:endParaRPr lang="en-GB" altLang="zh-TW" dirty="0">
+              <a:latin typeface="+mn-ea"/>
+            </a:endParaRPr>
+          </a:p>
+          <a:p>
+            <a:r>
+              <a:rPr lang="en-US" dirty="0" err="1">
+                <a:latin typeface="+mn-ea"/>
+              </a:rPr>
+              <a:t>相關檔案在</a:t>
+            </a:r>
+            <a:r>
+              <a:rPr lang="en-US" dirty="0">
+                <a:latin typeface="+mn-ea"/>
+              </a:rPr>
+              <a:t> Files and folders</a:t>
+            </a:r>
+            <a:r>
+              <a:rPr lang="zh-TW" altLang="en-US" dirty="0">
+                <a:latin typeface="+mn-ea"/>
+              </a:rPr>
+              <a:t> 底下顯示</a:t>
+            </a:r>
+            <a:endParaRPr lang="en-GB" altLang="zh-TW" dirty="0">
+              <a:latin typeface="+mn-ea"/>
+            </a:endParaRPr>
+          </a:p>
+          <a:p>
+            <a:r>
+              <a:rPr lang="en-US" dirty="0">
+                <a:latin typeface="+mn-ea"/>
+              </a:rPr>
+              <a:t>(Optional) </a:t>
+            </a:r>
+          </a:p>
+          <a:p>
+            <a:pPr lvl="1"/>
+            <a:r>
+              <a:rPr lang="en-US" dirty="0">
+                <a:latin typeface="+mn-ea"/>
+              </a:rPr>
+              <a:t>Permissions</a:t>
+            </a:r>
+            <a:r>
+              <a:rPr lang="zh-TW" altLang="en-US" dirty="0">
+                <a:latin typeface="+mn-ea"/>
+              </a:rPr>
+              <a:t>：決定是否允許其他人存取</a:t>
+            </a:r>
+            <a:endParaRPr lang="en-GB" altLang="zh-TW" dirty="0">
+              <a:latin typeface="+mn-ea"/>
+            </a:endParaRPr>
+          </a:p>
+          <a:p>
+            <a:pPr lvl="1"/>
+            <a:r>
+              <a:rPr lang="en-US" altLang="zh-TW" dirty="0">
+                <a:latin typeface="+mn-ea"/>
+              </a:rPr>
+              <a:t>Properties</a:t>
+            </a:r>
+            <a:r>
+              <a:rPr lang="zh-TW" altLang="en-US" dirty="0">
+                <a:latin typeface="+mn-ea"/>
+              </a:rPr>
+              <a:t>：決定使用哪一種儲存方式</a:t>
+            </a:r>
+            <a:endParaRPr lang="en-GB" altLang="zh-TW" dirty="0">
+              <a:latin typeface="+mn-ea"/>
+            </a:endParaRPr>
+          </a:p>
+          <a:p>
+            <a:r>
+              <a:rPr lang="en-US" dirty="0" err="1">
+                <a:latin typeface="+mn-ea"/>
+              </a:rPr>
+              <a:t>完成點擊</a:t>
+            </a:r>
+            <a:r>
+              <a:rPr lang="en-US" dirty="0">
+                <a:latin typeface="+mn-ea"/>
+              </a:rPr>
+              <a:t> OK (</a:t>
+            </a:r>
+            <a:r>
+              <a:rPr lang="en-US" dirty="0" err="1">
+                <a:latin typeface="+mn-ea"/>
+              </a:rPr>
+              <a:t>將上傳檔案</a:t>
+            </a:r>
+            <a:r>
+              <a:rPr lang="en-US" dirty="0">
+                <a:latin typeface="+mn-ea"/>
+              </a:rPr>
+              <a:t>)</a:t>
+            </a:r>
+          </a:p>
+        </p:txBody>
+      </p:sp>
+      <p:pic>
+        <p:nvPicPr>
+          <p:cNvPr id="4" name="Picture 3">
+            <a:extLst>
+              <a:ext uri="{FF2B5EF4-FFF2-40B4-BE49-F238E27FC236}">
+                <a16:creationId xmlns:a16="http://schemas.microsoft.com/office/drawing/2014/main" id="{19DA8D05-A85F-CBA4-0CC2-77F76E11F9EE}"/>
+              </a:ext>
+            </a:extLst>
+          </p:cNvPr>
+          <p:cNvPicPr>
+            <a:picLocks noChangeAspect="1"/>
+          </p:cNvPicPr>
+          <p:nvPr/>
+        </p:nvPicPr>
+        <p:blipFill>
+          <a:blip r:embed="rId2"/>
+          <a:stretch>
+            <a:fillRect/>
+          </a:stretch>
+        </p:blipFill>
+        <p:spPr>
+          <a:xfrm>
+            <a:off x="615389" y="1507242"/>
+            <a:ext cx="5142148" cy="4988104"/>
+          </a:xfrm>
+          <a:prstGeom prst="rect">
+            <a:avLst/>
+          </a:prstGeom>
+        </p:spPr>
+      </p:pic>
+      <p:sp>
+        <p:nvSpPr>
+          <p:cNvPr id="5" name="Rectangle 4">
+            <a:extLst>
+              <a:ext uri="{FF2B5EF4-FFF2-40B4-BE49-F238E27FC236}">
+                <a16:creationId xmlns:a16="http://schemas.microsoft.com/office/drawing/2014/main" id="{5D5A0207-0785-26C8-06FC-85ACD6E3230A}"/>
+              </a:ext>
+            </a:extLst>
+          </p:cNvPr>
+          <p:cNvSpPr/>
+          <p:nvPr/>
+        </p:nvSpPr>
+        <p:spPr>
+          <a:xfrm>
+            <a:off x="4058292" y="3030876"/>
+            <a:ext cx="1407560" cy="398124"/>
+          </a:xfrm>
+          <a:prstGeom prst="rect">
+            <a:avLst/>
+          </a:prstGeom>
+          <a:noFill/>
+          <a:ln>
+            <a:solidFill>
+              <a:srgbClr val="FF0000"/>
+            </a:solidFill>
+          </a:ln>
+        </p:spPr>
+        <p:style>
+          <a:lnRef idx="2">
+            <a:schemeClr val="accent1">
+              <a:shade val="15000"/>
+            </a:schemeClr>
+          </a:lnRef>
+          <a:fillRef idx="1">
+            <a:schemeClr val="accent1"/>
+          </a:fillRef>
+          <a:effectRef idx="0">
+            <a:schemeClr val="accent1"/>
+          </a:effectRef>
+          <a:fontRef idx="minor">
+            <a:schemeClr val="lt1"/>
+          </a:fontRef>
+        </p:style>
+        <p:txBody>
+          <a:bodyPr rtlCol="0" anchor="ctr"/>
+          <a:lstStyle/>
+          <a:p>
+            <a:pPr algn="ctr"/>
+            <a:endParaRPr lang="en-US">
+              <a:solidFill>
+                <a:srgbClr val="FF0000"/>
+              </a:solidFill>
+            </a:endParaRPr>
+          </a:p>
+        </p:txBody>
+      </p:sp>
+      <p:sp>
+        <p:nvSpPr>
+          <p:cNvPr id="6" name="Rectangle 5">
+            <a:extLst>
+              <a:ext uri="{FF2B5EF4-FFF2-40B4-BE49-F238E27FC236}">
+                <a16:creationId xmlns:a16="http://schemas.microsoft.com/office/drawing/2014/main" id="{CE39E63F-A393-D04A-8A8A-E9557FA3A533}"/>
+              </a:ext>
+            </a:extLst>
+          </p:cNvPr>
+          <p:cNvSpPr/>
+          <p:nvPr/>
+        </p:nvSpPr>
+        <p:spPr>
+          <a:xfrm>
+            <a:off x="838200" y="3760342"/>
+            <a:ext cx="4709845" cy="493159"/>
+          </a:xfrm>
+          <a:prstGeom prst="rect">
+            <a:avLst/>
+          </a:prstGeom>
+          <a:noFill/>
+          <a:ln>
+            <a:solidFill>
+              <a:srgbClr val="00B050"/>
+            </a:solidFill>
+          </a:ln>
+        </p:spPr>
+        <p:style>
+          <a:lnRef idx="2">
+            <a:schemeClr val="accent1">
+              <a:shade val="15000"/>
+            </a:schemeClr>
+          </a:lnRef>
+          <a:fillRef idx="1">
+            <a:schemeClr val="accent1"/>
+          </a:fillRef>
+          <a:effectRef idx="0">
+            <a:schemeClr val="accent1"/>
+          </a:effectRef>
+          <a:fontRef idx="minor">
+            <a:schemeClr val="lt1"/>
+          </a:fontRef>
+        </p:style>
+        <p:txBody>
+          <a:bodyPr rtlCol="0" anchor="ctr"/>
+          <a:lstStyle/>
+          <a:p>
+            <a:pPr algn="ctr"/>
+            <a:endParaRPr lang="en-US"/>
+          </a:p>
+        </p:txBody>
+      </p:sp>
+    </p:spTree>
+    <p:extLst>
+      <p:ext uri="{BB962C8B-B14F-4D97-AF65-F5344CB8AC3E}">
+        <p14:creationId xmlns:p14="http://schemas.microsoft.com/office/powerpoint/2010/main" val="1753725617"/>
+      </p:ext>
+    </p:extLst>
+  </p:cSld>
+  <p:clrMapOvr>
+    <a:masterClrMapping/>
+  </p:clrMapOvr>
+</p:sld>
+</file>
+
+<file path=ppt/slides/slide11.xml><?xml version="1.0" encoding="utf-8"?>
+<p:sld xmlns:a="http://schemas.openxmlformats.org/drawingml/2006/main" xmlns:r="http://schemas.openxmlformats.org/officeDocument/2006/relationships" xmlns:p="http://schemas.openxmlformats.org/presentationml/2006/main">
+  <p:cSld>
+    <p:spTree>
+      <p:nvGrpSpPr>
+        <p:cNvPr id="1" name=""/>
+        <p:cNvGrpSpPr/>
+        <p:nvPr/>
+      </p:nvGrpSpPr>
+      <p:grpSpPr>
+        <a:xfrm>
+          <a:off x="0" y="0"/>
+          <a:ext cx="0" cy="0"/>
+          <a:chOff x="0" y="0"/>
+          <a:chExt cx="0" cy="0"/>
+        </a:xfrm>
+      </p:grpSpPr>
+      <p:sp>
+        <p:nvSpPr>
+          <p:cNvPr id="2" name="Title 1">
+            <a:extLst>
+              <a:ext uri="{FF2B5EF4-FFF2-40B4-BE49-F238E27FC236}">
+                <a16:creationId xmlns:a16="http://schemas.microsoft.com/office/drawing/2014/main" id="{8FE99EFD-E55A-4A98-3F52-0AB03299FCEC}"/>
+              </a:ext>
+            </a:extLst>
+          </p:cNvPr>
+          <p:cNvSpPr>
+            <a:spLocks noGrp="1"/>
+          </p:cNvSpPr>
+          <p:nvPr>
+            <p:ph type="title"/>
+          </p:nvPr>
+        </p:nvSpPr>
+        <p:spPr/>
+        <p:txBody>
+          <a:bodyPr/>
+          <a:lstStyle/>
+          <a:p>
+            <a:r>
+              <a:rPr lang="en-US" dirty="0"/>
+              <a:t>Upload Object 3</a:t>
+            </a:r>
+          </a:p>
+        </p:txBody>
+      </p:sp>
+      <p:sp>
+        <p:nvSpPr>
+          <p:cNvPr id="3" name="Content Placeholder 2">
+            <a:extLst>
+              <a:ext uri="{FF2B5EF4-FFF2-40B4-BE49-F238E27FC236}">
+                <a16:creationId xmlns:a16="http://schemas.microsoft.com/office/drawing/2014/main" id="{D413255B-5434-B435-134B-19BA03B11915}"/>
+              </a:ext>
+            </a:extLst>
+          </p:cNvPr>
+          <p:cNvSpPr>
+            <a:spLocks noGrp="1"/>
+          </p:cNvSpPr>
+          <p:nvPr>
+            <p:ph idx="1"/>
+          </p:nvPr>
+        </p:nvSpPr>
+        <p:spPr>
+          <a:xfrm>
+            <a:off x="8024116" y="1555752"/>
+            <a:ext cx="4064286" cy="5148922"/>
+          </a:xfrm>
+        </p:spPr>
+        <p:txBody>
+          <a:bodyPr>
+            <a:normAutofit/>
+          </a:bodyPr>
+          <a:lstStyle/>
+          <a:p>
+            <a:r>
+              <a:rPr lang="en-US" dirty="0" err="1">
+                <a:latin typeface="+mn-ea"/>
+              </a:rPr>
+              <a:t>若upload</a:t>
+            </a:r>
+            <a:r>
+              <a:rPr lang="en-US" dirty="0">
+                <a:latin typeface="+mn-ea"/>
+              </a:rPr>
+              <a:t> success</a:t>
+            </a:r>
+            <a:r>
+              <a:rPr lang="zh-TW" altLang="en-US" dirty="0">
+                <a:latin typeface="+mn-ea"/>
+              </a:rPr>
+              <a:t>，可進入相關畫面</a:t>
+            </a:r>
+            <a:endParaRPr lang="en-US" dirty="0">
+              <a:latin typeface="+mn-ea"/>
+            </a:endParaRPr>
+          </a:p>
+          <a:p>
+            <a:r>
+              <a:rPr lang="en-US" dirty="0">
+                <a:latin typeface="+mn-ea"/>
+              </a:rPr>
+              <a:t>Object </a:t>
+            </a:r>
+            <a:r>
+              <a:rPr lang="en-US" dirty="0" err="1">
+                <a:latin typeface="+mn-ea"/>
+              </a:rPr>
+              <a:t>資料如下</a:t>
+            </a:r>
+            <a:endParaRPr lang="en-US" dirty="0">
+              <a:latin typeface="+mn-ea"/>
+            </a:endParaRPr>
+          </a:p>
+          <a:p>
+            <a:pPr lvl="1"/>
+            <a:r>
+              <a:rPr lang="en-US" dirty="0">
+                <a:latin typeface="+mn-ea"/>
+              </a:rPr>
+              <a:t>Key: </a:t>
+            </a:r>
+            <a:r>
+              <a:rPr lang="en-US" dirty="0" err="1">
+                <a:latin typeface="+mn-ea"/>
+              </a:rPr>
+              <a:t>檔案名稱</a:t>
+            </a:r>
+            <a:endParaRPr lang="en-US" dirty="0">
+              <a:latin typeface="+mn-ea"/>
+            </a:endParaRPr>
+          </a:p>
+          <a:p>
+            <a:pPr lvl="1"/>
+            <a:r>
+              <a:rPr lang="en-US" dirty="0">
+                <a:latin typeface="+mn-ea"/>
+              </a:rPr>
+              <a:t>Object URL: </a:t>
+            </a:r>
+            <a:r>
+              <a:rPr lang="zh-TW" altLang="en-US" dirty="0">
+                <a:latin typeface="+mn-ea"/>
+              </a:rPr>
+              <a:t>存取檔案</a:t>
+            </a:r>
+            <a:r>
+              <a:rPr lang="en-US" altLang="zh-TW" dirty="0">
+                <a:latin typeface="+mn-ea"/>
+              </a:rPr>
+              <a:t>URL</a:t>
+            </a:r>
+          </a:p>
+          <a:p>
+            <a:r>
+              <a:rPr lang="en-US" dirty="0" err="1">
+                <a:latin typeface="+mn-ea"/>
+              </a:rPr>
+              <a:t>由於一開始Bucket</a:t>
+            </a:r>
+            <a:r>
+              <a:rPr lang="en-US" dirty="0">
+                <a:latin typeface="+mn-ea"/>
+              </a:rPr>
+              <a:t> Policy </a:t>
+            </a:r>
+            <a:r>
+              <a:rPr lang="en-US" dirty="0" err="1">
+                <a:latin typeface="+mn-ea"/>
+              </a:rPr>
+              <a:t>設定</a:t>
+            </a:r>
+            <a:r>
+              <a:rPr lang="zh-TW" altLang="en-US" dirty="0">
+                <a:latin typeface="+mn-ea"/>
+              </a:rPr>
+              <a:t> </a:t>
+            </a:r>
+            <a:r>
+              <a:rPr lang="en-US" altLang="zh-TW" dirty="0">
+                <a:latin typeface="+mn-ea"/>
+              </a:rPr>
+              <a:t>Disabled</a:t>
+            </a:r>
+            <a:r>
+              <a:rPr lang="zh-TW" altLang="en-US" dirty="0">
+                <a:latin typeface="+mn-ea"/>
+              </a:rPr>
+              <a:t>，故目前所有在相同</a:t>
+            </a:r>
+            <a:r>
+              <a:rPr lang="en-US" altLang="zh-TW" dirty="0">
+                <a:latin typeface="+mn-ea"/>
+              </a:rPr>
+              <a:t>bucket</a:t>
+            </a:r>
+            <a:r>
+              <a:rPr lang="zh-TW" altLang="en-US" dirty="0">
+                <a:latin typeface="+mn-ea"/>
+              </a:rPr>
+              <a:t>的檔案均無法查閱</a:t>
+            </a:r>
+            <a:endParaRPr lang="en-US" dirty="0">
+              <a:latin typeface="+mn-ea"/>
+            </a:endParaRPr>
+          </a:p>
+        </p:txBody>
+      </p:sp>
+      <p:pic>
+        <p:nvPicPr>
+          <p:cNvPr id="4" name="Picture 3">
+            <a:extLst>
+              <a:ext uri="{FF2B5EF4-FFF2-40B4-BE49-F238E27FC236}">
+                <a16:creationId xmlns:a16="http://schemas.microsoft.com/office/drawing/2014/main" id="{4D8F12A0-9608-69F1-A205-0F670F2D3607}"/>
+              </a:ext>
+            </a:extLst>
+          </p:cNvPr>
+          <p:cNvPicPr>
+            <a:picLocks noChangeAspect="1"/>
+          </p:cNvPicPr>
+          <p:nvPr/>
+        </p:nvPicPr>
+        <p:blipFill>
+          <a:blip r:embed="rId2"/>
+          <a:stretch>
+            <a:fillRect/>
+          </a:stretch>
+        </p:blipFill>
+        <p:spPr>
+          <a:xfrm>
+            <a:off x="103598" y="1555751"/>
+            <a:ext cx="7772400" cy="3004703"/>
+          </a:xfrm>
+          <a:prstGeom prst="rect">
+            <a:avLst/>
+          </a:prstGeom>
+        </p:spPr>
+      </p:pic>
+      <p:pic>
+        <p:nvPicPr>
+          <p:cNvPr id="5" name="Picture 4">
+            <a:extLst>
+              <a:ext uri="{FF2B5EF4-FFF2-40B4-BE49-F238E27FC236}">
+                <a16:creationId xmlns:a16="http://schemas.microsoft.com/office/drawing/2014/main" id="{B9EFBFFE-5552-F581-ADFC-2E1079E43234}"/>
+              </a:ext>
+            </a:extLst>
+          </p:cNvPr>
+          <p:cNvPicPr>
+            <a:picLocks noChangeAspect="1"/>
+          </p:cNvPicPr>
+          <p:nvPr/>
+        </p:nvPicPr>
+        <p:blipFill>
+          <a:blip r:embed="rId3"/>
+          <a:stretch>
+            <a:fillRect/>
+          </a:stretch>
+        </p:blipFill>
+        <p:spPr>
+          <a:xfrm>
+            <a:off x="251716" y="4695391"/>
+            <a:ext cx="7772400" cy="2009283"/>
+          </a:xfrm>
+          <a:prstGeom prst="rect">
+            <a:avLst/>
+          </a:prstGeom>
+        </p:spPr>
+      </p:pic>
+    </p:spTree>
+    <p:extLst>
+      <p:ext uri="{BB962C8B-B14F-4D97-AF65-F5344CB8AC3E}">
+        <p14:creationId xmlns:p14="http://schemas.microsoft.com/office/powerpoint/2010/main" val="2020593226"/>
+      </p:ext>
+    </p:extLst>
+  </p:cSld>
+  <p:clrMapOvr>
+    <a:masterClrMapping/>
+  </p:clrMapOvr>
+</p:sld>
+</file>
+
+<file path=ppt/slides/slide12.xml><?xml version="1.0" encoding="utf-8"?>
+<p:sld xmlns:a="http://schemas.openxmlformats.org/drawingml/2006/main" xmlns:r="http://schemas.openxmlformats.org/officeDocument/2006/relationships" xmlns:p="http://schemas.openxmlformats.org/presentationml/2006/main">
+  <p:cSld>
+    <p:spTree>
+      <p:nvGrpSpPr>
+        <p:cNvPr id="1" name=""/>
+        <p:cNvGrpSpPr/>
+        <p:nvPr/>
+      </p:nvGrpSpPr>
+      <p:grpSpPr>
+        <a:xfrm>
+          <a:off x="0" y="0"/>
+          <a:ext cx="0" cy="0"/>
+          <a:chOff x="0" y="0"/>
+          <a:chExt cx="0" cy="0"/>
+        </a:xfrm>
+      </p:grpSpPr>
+      <p:sp>
+        <p:nvSpPr>
+          <p:cNvPr id="2" name="Title 1">
+            <a:extLst>
+              <a:ext uri="{FF2B5EF4-FFF2-40B4-BE49-F238E27FC236}">
+                <a16:creationId xmlns:a16="http://schemas.microsoft.com/office/drawing/2014/main" id="{D87A8908-2FBB-0C0D-1B4F-82BC7CB4EB84}"/>
+              </a:ext>
+            </a:extLst>
+          </p:cNvPr>
+          <p:cNvSpPr>
+            <a:spLocks noGrp="1"/>
+          </p:cNvSpPr>
+          <p:nvPr>
+            <p:ph type="title"/>
+          </p:nvPr>
+        </p:nvSpPr>
+        <p:spPr/>
+        <p:txBody>
+          <a:bodyPr/>
+          <a:lstStyle/>
+          <a:p>
+            <a:r>
+              <a:rPr lang="en-US" dirty="0"/>
+              <a:t>Enable Access</a:t>
+            </a:r>
+          </a:p>
+        </p:txBody>
+      </p:sp>
+      <p:sp>
+        <p:nvSpPr>
+          <p:cNvPr id="3" name="Text Placeholder 2">
+            <a:extLst>
+              <a:ext uri="{FF2B5EF4-FFF2-40B4-BE49-F238E27FC236}">
+                <a16:creationId xmlns:a16="http://schemas.microsoft.com/office/drawing/2014/main" id="{C1F66DEB-1CCB-716A-3B7D-975007DF3AED}"/>
+              </a:ext>
+            </a:extLst>
+          </p:cNvPr>
+          <p:cNvSpPr>
+            <a:spLocks noGrp="1"/>
+          </p:cNvSpPr>
+          <p:nvPr>
+            <p:ph type="body" idx="1"/>
+          </p:nvPr>
+        </p:nvSpPr>
+        <p:spPr/>
+        <p:txBody>
+          <a:bodyPr/>
+          <a:lstStyle/>
+          <a:p>
+            <a:endParaRPr lang="en-US"/>
+          </a:p>
+        </p:txBody>
+      </p:sp>
+    </p:spTree>
+    <p:extLst>
+      <p:ext uri="{BB962C8B-B14F-4D97-AF65-F5344CB8AC3E}">
+        <p14:creationId xmlns:p14="http://schemas.microsoft.com/office/powerpoint/2010/main" val="3358637733"/>
+      </p:ext>
+    </p:extLst>
+  </p:cSld>
+  <p:clrMapOvr>
+    <a:masterClrMapping/>
+  </p:clrMapOvr>
+</p:sld>
+</file>
+
+<file path=ppt/slides/slide13.xml><?xml version="1.0" encoding="utf-8"?>
+<p:sld xmlns:a="http://schemas.openxmlformats.org/drawingml/2006/main" xmlns:r="http://schemas.openxmlformats.org/officeDocument/2006/relationships" xmlns:p="http://schemas.openxmlformats.org/presentationml/2006/main">
+  <p:cSld>
+    <p:spTree>
+      <p:nvGrpSpPr>
+        <p:cNvPr id="1" name=""/>
+        <p:cNvGrpSpPr/>
+        <p:nvPr/>
+      </p:nvGrpSpPr>
+      <p:grpSpPr>
+        <a:xfrm>
+          <a:off x="0" y="0"/>
+          <a:ext cx="0" cy="0"/>
+          <a:chOff x="0" y="0"/>
+          <a:chExt cx="0" cy="0"/>
+        </a:xfrm>
+      </p:grpSpPr>
+      <p:sp>
+        <p:nvSpPr>
+          <p:cNvPr id="2" name="Title 1">
+            <a:extLst>
+              <a:ext uri="{FF2B5EF4-FFF2-40B4-BE49-F238E27FC236}">
+                <a16:creationId xmlns:a16="http://schemas.microsoft.com/office/drawing/2014/main" id="{83709A40-A6F8-DB90-86CA-87B2B44B4FA0}"/>
+              </a:ext>
+            </a:extLst>
+          </p:cNvPr>
+          <p:cNvSpPr>
+            <a:spLocks noGrp="1"/>
+          </p:cNvSpPr>
+          <p:nvPr>
+            <p:ph type="title"/>
+          </p:nvPr>
+        </p:nvSpPr>
+        <p:spPr/>
+        <p:txBody>
+          <a:bodyPr/>
+          <a:lstStyle/>
+          <a:p>
+            <a:r>
+              <a:rPr lang="en-US" dirty="0"/>
+              <a:t>Enable Access 1</a:t>
+            </a:r>
+          </a:p>
+        </p:txBody>
+      </p:sp>
+      <p:sp>
+        <p:nvSpPr>
+          <p:cNvPr id="3" name="Content Placeholder 2">
+            <a:extLst>
+              <a:ext uri="{FF2B5EF4-FFF2-40B4-BE49-F238E27FC236}">
+                <a16:creationId xmlns:a16="http://schemas.microsoft.com/office/drawing/2014/main" id="{2B1A675D-C3AA-B607-63FC-B18E8BD40668}"/>
+              </a:ext>
+            </a:extLst>
+          </p:cNvPr>
+          <p:cNvSpPr>
+            <a:spLocks noGrp="1"/>
+          </p:cNvSpPr>
+          <p:nvPr>
+            <p:ph idx="1"/>
+          </p:nvPr>
+        </p:nvSpPr>
+        <p:spPr>
+          <a:xfrm>
+            <a:off x="8116585" y="1775939"/>
+            <a:ext cx="3869076" cy="4351338"/>
+          </a:xfrm>
+          <a:ln>
+            <a:solidFill>
+              <a:schemeClr val="accent6"/>
+            </a:solidFill>
+          </a:ln>
+        </p:spPr>
+        <p:txBody>
+          <a:bodyPr/>
+          <a:lstStyle/>
+          <a:p>
+            <a:r>
+              <a:rPr lang="en-US" dirty="0" err="1"/>
+              <a:t>進入</a:t>
+            </a:r>
+            <a:r>
+              <a:rPr lang="zh-TW" altLang="en-US" dirty="0"/>
+              <a:t> </a:t>
+            </a:r>
+            <a:r>
+              <a:rPr lang="en-US" altLang="zh-TW" dirty="0"/>
+              <a:t>Bucket Panel</a:t>
+            </a:r>
+            <a:r>
+              <a:rPr lang="zh-TW" altLang="en-US" dirty="0"/>
+              <a:t>，點擊 </a:t>
+            </a:r>
+            <a:r>
+              <a:rPr lang="en-US" altLang="zh-TW" dirty="0">
+                <a:solidFill>
+                  <a:srgbClr val="FF0000"/>
+                </a:solidFill>
+              </a:rPr>
+              <a:t>Permissions</a:t>
+            </a:r>
+          </a:p>
+          <a:p>
+            <a:r>
+              <a:rPr lang="en-US" dirty="0" err="1"/>
+              <a:t>查閱Block</a:t>
+            </a:r>
+            <a:r>
+              <a:rPr lang="en-US" dirty="0"/>
+              <a:t> Public Access </a:t>
+            </a:r>
+            <a:r>
+              <a:rPr lang="zh-TW" altLang="en-US" dirty="0"/>
+              <a:t>，發現 </a:t>
+            </a:r>
+            <a:r>
+              <a:rPr lang="en-US" altLang="zh-TW" dirty="0"/>
+              <a:t>block all public access</a:t>
+            </a:r>
+            <a:r>
+              <a:rPr lang="zh-TW" altLang="en-US" dirty="0"/>
+              <a:t> 為</a:t>
+            </a:r>
+            <a:r>
+              <a:rPr lang="en-US" altLang="zh-TW" dirty="0"/>
+              <a:t>on</a:t>
+            </a:r>
+            <a:r>
+              <a:rPr lang="zh-TW" altLang="en-US" dirty="0"/>
+              <a:t>，代表整個</a:t>
+            </a:r>
+            <a:r>
+              <a:rPr lang="en-US" altLang="zh-TW" dirty="0"/>
+              <a:t>bucket</a:t>
+            </a:r>
+            <a:r>
+              <a:rPr lang="zh-TW" altLang="en-US" dirty="0"/>
+              <a:t>無法被</a:t>
+            </a:r>
+            <a:r>
+              <a:rPr lang="en-US" altLang="zh-TW" dirty="0"/>
+              <a:t>public </a:t>
+            </a:r>
+            <a:r>
+              <a:rPr lang="zh-TW" altLang="en-US" dirty="0"/>
+              <a:t>存取</a:t>
+            </a:r>
+            <a:endParaRPr lang="en-GB" altLang="zh-TW" dirty="0"/>
+          </a:p>
+          <a:p>
+            <a:r>
+              <a:rPr lang="zh-TW" altLang="en-US" dirty="0"/>
+              <a:t>按</a:t>
+            </a:r>
+            <a:r>
+              <a:rPr lang="en-US" altLang="zh-TW" dirty="0">
+                <a:solidFill>
+                  <a:schemeClr val="accent6"/>
+                </a:solidFill>
+              </a:rPr>
+              <a:t>Edit</a:t>
+            </a:r>
+            <a:endParaRPr lang="en-US" dirty="0">
+              <a:solidFill>
+                <a:schemeClr val="accent6"/>
+              </a:solidFill>
+            </a:endParaRPr>
+          </a:p>
+        </p:txBody>
+      </p:sp>
+      <p:pic>
+        <p:nvPicPr>
+          <p:cNvPr id="4" name="Picture 3">
+            <a:extLst>
+              <a:ext uri="{FF2B5EF4-FFF2-40B4-BE49-F238E27FC236}">
+                <a16:creationId xmlns:a16="http://schemas.microsoft.com/office/drawing/2014/main" id="{7950F089-BF36-0896-6F7C-4A093CE50CE8}"/>
+              </a:ext>
+            </a:extLst>
+          </p:cNvPr>
+          <p:cNvPicPr>
+            <a:picLocks noChangeAspect="1"/>
+          </p:cNvPicPr>
+          <p:nvPr/>
+        </p:nvPicPr>
+        <p:blipFill>
+          <a:blip r:embed="rId2"/>
+          <a:stretch>
+            <a:fillRect/>
+          </a:stretch>
+        </p:blipFill>
+        <p:spPr>
+          <a:xfrm>
+            <a:off x="206339" y="1726254"/>
+            <a:ext cx="7772400" cy="4450709"/>
+          </a:xfrm>
+          <a:prstGeom prst="rect">
+            <a:avLst/>
+          </a:prstGeom>
+        </p:spPr>
+      </p:pic>
+      <p:sp>
+        <p:nvSpPr>
+          <p:cNvPr id="5" name="Rectangle 4">
+            <a:extLst>
+              <a:ext uri="{FF2B5EF4-FFF2-40B4-BE49-F238E27FC236}">
+                <a16:creationId xmlns:a16="http://schemas.microsoft.com/office/drawing/2014/main" id="{B9ABF386-77A7-70D3-AB06-BF05631D22CB}"/>
+              </a:ext>
+            </a:extLst>
+          </p:cNvPr>
+          <p:cNvSpPr/>
+          <p:nvPr/>
+        </p:nvSpPr>
+        <p:spPr>
+          <a:xfrm>
+            <a:off x="1171254" y="2476072"/>
+            <a:ext cx="575353" cy="267128"/>
+          </a:xfrm>
+          <a:prstGeom prst="rect">
+            <a:avLst/>
+          </a:prstGeom>
+          <a:noFill/>
+          <a:ln>
+            <a:solidFill>
+              <a:srgbClr val="FF0000"/>
+            </a:solidFill>
+          </a:ln>
+        </p:spPr>
+        <p:style>
+          <a:lnRef idx="2">
+            <a:schemeClr val="accent1">
+              <a:shade val="15000"/>
+            </a:schemeClr>
+          </a:lnRef>
+          <a:fillRef idx="1">
+            <a:schemeClr val="accent1"/>
+          </a:fillRef>
+          <a:effectRef idx="0">
+            <a:schemeClr val="accent1"/>
+          </a:effectRef>
+          <a:fontRef idx="minor">
+            <a:schemeClr val="lt1"/>
+          </a:fontRef>
+        </p:style>
+        <p:txBody>
+          <a:bodyPr rtlCol="0" anchor="ctr"/>
+          <a:lstStyle/>
+          <a:p>
+            <a:pPr algn="ctr"/>
+            <a:endParaRPr lang="en-US"/>
+          </a:p>
+        </p:txBody>
+      </p:sp>
+      <p:sp>
+        <p:nvSpPr>
+          <p:cNvPr id="6" name="Rectangle 5">
+            <a:extLst>
+              <a:ext uri="{FF2B5EF4-FFF2-40B4-BE49-F238E27FC236}">
+                <a16:creationId xmlns:a16="http://schemas.microsoft.com/office/drawing/2014/main" id="{E8A7B9E0-25C3-B339-71DB-565D32AE9BAD}"/>
+              </a:ext>
+            </a:extLst>
+          </p:cNvPr>
+          <p:cNvSpPr/>
+          <p:nvPr/>
+        </p:nvSpPr>
+        <p:spPr>
+          <a:xfrm>
+            <a:off x="206339" y="3688422"/>
+            <a:ext cx="7673940" cy="1232899"/>
+          </a:xfrm>
+          <a:prstGeom prst="rect">
+            <a:avLst/>
+          </a:prstGeom>
+          <a:noFill/>
+          <a:ln>
+            <a:solidFill>
+              <a:schemeClr val="accent1"/>
+            </a:solidFill>
+          </a:ln>
+        </p:spPr>
+        <p:style>
+          <a:lnRef idx="2">
+            <a:schemeClr val="accent1">
+              <a:shade val="15000"/>
+            </a:schemeClr>
+          </a:lnRef>
+          <a:fillRef idx="1">
+            <a:schemeClr val="accent1"/>
+          </a:fillRef>
+          <a:effectRef idx="0">
+            <a:schemeClr val="accent1"/>
+          </a:effectRef>
+          <a:fontRef idx="minor">
+            <a:schemeClr val="lt1"/>
+          </a:fontRef>
+        </p:style>
+        <p:txBody>
+          <a:bodyPr rtlCol="0" anchor="ctr"/>
+          <a:lstStyle/>
+          <a:p>
+            <a:pPr algn="ctr"/>
+            <a:endParaRPr lang="en-US"/>
+          </a:p>
+        </p:txBody>
+      </p:sp>
+      <p:sp>
+        <p:nvSpPr>
+          <p:cNvPr id="7" name="Rectangle 6">
+            <a:extLst>
+              <a:ext uri="{FF2B5EF4-FFF2-40B4-BE49-F238E27FC236}">
+                <a16:creationId xmlns:a16="http://schemas.microsoft.com/office/drawing/2014/main" id="{2DB341A1-99C0-D9BB-45BC-BC679205AAB1}"/>
+              </a:ext>
+            </a:extLst>
+          </p:cNvPr>
+          <p:cNvSpPr/>
+          <p:nvPr/>
+        </p:nvSpPr>
+        <p:spPr>
+          <a:xfrm>
+            <a:off x="7448764" y="3688422"/>
+            <a:ext cx="431515" cy="267129"/>
+          </a:xfrm>
+          <a:prstGeom prst="rect">
+            <a:avLst/>
+          </a:prstGeom>
+          <a:noFill/>
+          <a:ln>
+            <a:solidFill>
+              <a:schemeClr val="accent6"/>
+            </a:solidFill>
+          </a:ln>
+        </p:spPr>
+        <p:style>
+          <a:lnRef idx="2">
+            <a:schemeClr val="accent1">
+              <a:shade val="15000"/>
+            </a:schemeClr>
+          </a:lnRef>
+          <a:fillRef idx="1">
+            <a:schemeClr val="accent1"/>
+          </a:fillRef>
+          <a:effectRef idx="0">
+            <a:schemeClr val="accent1"/>
+          </a:effectRef>
+          <a:fontRef idx="minor">
+            <a:schemeClr val="lt1"/>
+          </a:fontRef>
+        </p:style>
+        <p:txBody>
+          <a:bodyPr rtlCol="0" anchor="ctr"/>
+          <a:lstStyle/>
+          <a:p>
+            <a:pPr algn="ctr"/>
+            <a:endParaRPr lang="en-US"/>
+          </a:p>
+        </p:txBody>
+      </p:sp>
+    </p:spTree>
+    <p:extLst>
+      <p:ext uri="{BB962C8B-B14F-4D97-AF65-F5344CB8AC3E}">
+        <p14:creationId xmlns:p14="http://schemas.microsoft.com/office/powerpoint/2010/main" val="1123345313"/>
+      </p:ext>
+    </p:extLst>
+  </p:cSld>
+  <p:clrMapOvr>
+    <a:masterClrMapping/>
+  </p:clrMapOvr>
+</p:sld>
+</file>
+
+<file path=ppt/slides/slide14.xml><?xml version="1.0" encoding="utf-8"?>
+<p:sld xmlns:a="http://schemas.openxmlformats.org/drawingml/2006/main" xmlns:r="http://schemas.openxmlformats.org/officeDocument/2006/relationships" xmlns:p="http://schemas.openxmlformats.org/presentationml/2006/main">
+  <p:cSld>
+    <p:spTree>
+      <p:nvGrpSpPr>
+        <p:cNvPr id="1" name=""/>
+        <p:cNvGrpSpPr/>
+        <p:nvPr/>
+      </p:nvGrpSpPr>
+      <p:grpSpPr>
+        <a:xfrm>
+          <a:off x="0" y="0"/>
+          <a:ext cx="0" cy="0"/>
+          <a:chOff x="0" y="0"/>
+          <a:chExt cx="0" cy="0"/>
+        </a:xfrm>
+      </p:grpSpPr>
+      <p:sp>
+        <p:nvSpPr>
+          <p:cNvPr id="2" name="Title 1">
+            <a:extLst>
+              <a:ext uri="{FF2B5EF4-FFF2-40B4-BE49-F238E27FC236}">
+                <a16:creationId xmlns:a16="http://schemas.microsoft.com/office/drawing/2014/main" id="{45FF602F-1B5F-1407-6A6E-8A8B75F0C12B}"/>
+              </a:ext>
+            </a:extLst>
+          </p:cNvPr>
+          <p:cNvSpPr>
+            <a:spLocks noGrp="1"/>
+          </p:cNvSpPr>
+          <p:nvPr>
+            <p:ph type="title"/>
+          </p:nvPr>
+        </p:nvSpPr>
+        <p:spPr/>
+        <p:txBody>
+          <a:bodyPr/>
+          <a:lstStyle/>
+          <a:p>
+            <a:r>
+              <a:rPr lang="en-US" dirty="0"/>
+              <a:t>Enable Access 2</a:t>
+            </a:r>
+          </a:p>
+        </p:txBody>
+      </p:sp>
+      <p:sp>
+        <p:nvSpPr>
+          <p:cNvPr id="3" name="Content Placeholder 2">
+            <a:extLst>
+              <a:ext uri="{FF2B5EF4-FFF2-40B4-BE49-F238E27FC236}">
+                <a16:creationId xmlns:a16="http://schemas.microsoft.com/office/drawing/2014/main" id="{DA551D3F-06E0-2D14-D762-98842E422CAF}"/>
+              </a:ext>
+            </a:extLst>
+          </p:cNvPr>
+          <p:cNvSpPr>
+            <a:spLocks noGrp="1"/>
+          </p:cNvSpPr>
+          <p:nvPr>
+            <p:ph idx="1"/>
+          </p:nvPr>
+        </p:nvSpPr>
+        <p:spPr>
+          <a:xfrm>
+            <a:off x="7048505" y="1428948"/>
+            <a:ext cx="4890066" cy="5063925"/>
+          </a:xfrm>
+        </p:spPr>
+        <p:txBody>
+          <a:bodyPr/>
+          <a:lstStyle/>
+          <a:p>
+            <a:r>
+              <a:rPr lang="en-US" dirty="0" err="1"/>
+              <a:t>取消點擊</a:t>
+            </a:r>
+            <a:r>
+              <a:rPr lang="zh-TW" altLang="en-US" dirty="0"/>
+              <a:t> </a:t>
+            </a:r>
+            <a:r>
+              <a:rPr lang="en-US" altLang="zh-TW" dirty="0">
+                <a:solidFill>
+                  <a:srgbClr val="FF0000"/>
+                </a:solidFill>
+              </a:rPr>
+              <a:t>Block all public access</a:t>
+            </a:r>
+          </a:p>
+          <a:p>
+            <a:r>
+              <a:rPr lang="en-US" dirty="0" err="1"/>
+              <a:t>點擊右下角</a:t>
+            </a:r>
+            <a:r>
+              <a:rPr lang="zh-TW" altLang="en-US" dirty="0"/>
+              <a:t> </a:t>
+            </a:r>
+            <a:r>
+              <a:rPr lang="en-US" altLang="zh-TW" dirty="0">
+                <a:solidFill>
+                  <a:srgbClr val="FF0000"/>
+                </a:solidFill>
+              </a:rPr>
+              <a:t>Save Changes</a:t>
+            </a:r>
+          </a:p>
+          <a:p>
+            <a:endParaRPr lang="en-US" dirty="0"/>
+          </a:p>
+        </p:txBody>
+      </p:sp>
+      <p:pic>
+        <p:nvPicPr>
+          <p:cNvPr id="4" name="Picture 3">
+            <a:extLst>
+              <a:ext uri="{FF2B5EF4-FFF2-40B4-BE49-F238E27FC236}">
+                <a16:creationId xmlns:a16="http://schemas.microsoft.com/office/drawing/2014/main" id="{29105D23-E85E-2097-78DB-7BDC3657DFBE}"/>
+              </a:ext>
+            </a:extLst>
+          </p:cNvPr>
+          <p:cNvPicPr>
+            <a:picLocks noChangeAspect="1"/>
+          </p:cNvPicPr>
+          <p:nvPr/>
+        </p:nvPicPr>
+        <p:blipFill>
+          <a:blip r:embed="rId2"/>
+          <a:stretch>
+            <a:fillRect/>
+          </a:stretch>
+        </p:blipFill>
+        <p:spPr>
+          <a:xfrm>
+            <a:off x="598893" y="1428949"/>
+            <a:ext cx="6210305" cy="5063926"/>
+          </a:xfrm>
+          <a:prstGeom prst="rect">
+            <a:avLst/>
+          </a:prstGeom>
+        </p:spPr>
+      </p:pic>
+      <p:sp>
+        <p:nvSpPr>
+          <p:cNvPr id="5" name="Rectangle 4">
+            <a:extLst>
+              <a:ext uri="{FF2B5EF4-FFF2-40B4-BE49-F238E27FC236}">
+                <a16:creationId xmlns:a16="http://schemas.microsoft.com/office/drawing/2014/main" id="{F4567C76-C095-F800-8D7E-97AE7FC8FBB5}"/>
+              </a:ext>
+            </a:extLst>
+          </p:cNvPr>
+          <p:cNvSpPr/>
+          <p:nvPr/>
+        </p:nvSpPr>
+        <p:spPr>
+          <a:xfrm>
+            <a:off x="1006867" y="3429000"/>
+            <a:ext cx="5486400" cy="392987"/>
+          </a:xfrm>
+          <a:prstGeom prst="rect">
+            <a:avLst/>
+          </a:prstGeom>
+          <a:noFill/>
+          <a:ln>
+            <a:solidFill>
+              <a:srgbClr val="FF0000"/>
+            </a:solidFill>
+          </a:ln>
+        </p:spPr>
+        <p:style>
+          <a:lnRef idx="2">
+            <a:schemeClr val="accent1">
+              <a:shade val="15000"/>
+            </a:schemeClr>
+          </a:lnRef>
+          <a:fillRef idx="1">
+            <a:schemeClr val="accent1"/>
+          </a:fillRef>
+          <a:effectRef idx="0">
+            <a:schemeClr val="accent1"/>
+          </a:effectRef>
+          <a:fontRef idx="minor">
+            <a:schemeClr val="lt1"/>
+          </a:fontRef>
+        </p:style>
+        <p:txBody>
+          <a:bodyPr rtlCol="0" anchor="ctr"/>
+          <a:lstStyle/>
+          <a:p>
+            <a:pPr algn="ctr"/>
+            <a:endParaRPr lang="en-US"/>
+          </a:p>
+        </p:txBody>
+      </p:sp>
+      <p:sp>
+        <p:nvSpPr>
+          <p:cNvPr id="6" name="Rectangle 5">
+            <a:extLst>
+              <a:ext uri="{FF2B5EF4-FFF2-40B4-BE49-F238E27FC236}">
+                <a16:creationId xmlns:a16="http://schemas.microsoft.com/office/drawing/2014/main" id="{84B0D607-9EDF-8116-C0E7-9AF3105CB55B}"/>
+              </a:ext>
+            </a:extLst>
+          </p:cNvPr>
+          <p:cNvSpPr/>
+          <p:nvPr/>
+        </p:nvSpPr>
+        <p:spPr>
+          <a:xfrm>
+            <a:off x="5619964" y="5979560"/>
+            <a:ext cx="1037690" cy="400692"/>
+          </a:xfrm>
+          <a:prstGeom prst="rect">
+            <a:avLst/>
+          </a:prstGeom>
+          <a:noFill/>
+          <a:ln>
+            <a:solidFill>
+              <a:srgbClr val="FF0000"/>
+            </a:solidFill>
+          </a:ln>
+        </p:spPr>
+        <p:style>
+          <a:lnRef idx="2">
+            <a:schemeClr val="accent1">
+              <a:shade val="15000"/>
+            </a:schemeClr>
+          </a:lnRef>
+          <a:fillRef idx="1">
+            <a:schemeClr val="accent1"/>
+          </a:fillRef>
+          <a:effectRef idx="0">
+            <a:schemeClr val="accent1"/>
+          </a:effectRef>
+          <a:fontRef idx="minor">
+            <a:schemeClr val="lt1"/>
+          </a:fontRef>
+        </p:style>
+        <p:txBody>
+          <a:bodyPr rtlCol="0" anchor="ctr"/>
+          <a:lstStyle/>
+          <a:p>
+            <a:pPr algn="ctr"/>
+            <a:endParaRPr lang="en-US"/>
+          </a:p>
+        </p:txBody>
+      </p:sp>
+      <p:sp>
+        <p:nvSpPr>
+          <p:cNvPr id="7" name="Down Arrow 6">
+            <a:extLst>
+              <a:ext uri="{FF2B5EF4-FFF2-40B4-BE49-F238E27FC236}">
+                <a16:creationId xmlns:a16="http://schemas.microsoft.com/office/drawing/2014/main" id="{DE61D1F8-383A-8B60-E4A8-20D50953FFCB}"/>
+              </a:ext>
+            </a:extLst>
+          </p:cNvPr>
+          <p:cNvSpPr/>
+          <p:nvPr/>
+        </p:nvSpPr>
+        <p:spPr>
+          <a:xfrm>
+            <a:off x="5871680" y="3960910"/>
+            <a:ext cx="534257" cy="1941816"/>
+          </a:xfrm>
+          <a:prstGeom prst="downArrow">
+            <a:avLst/>
+          </a:prstGeom>
+        </p:spPr>
+        <p:style>
+          <a:lnRef idx="2">
+            <a:schemeClr val="accent1">
+              <a:shade val="15000"/>
+            </a:schemeClr>
+          </a:lnRef>
+          <a:fillRef idx="1">
+            <a:schemeClr val="accent1"/>
+          </a:fillRef>
+          <a:effectRef idx="0">
+            <a:schemeClr val="accent1"/>
+          </a:effectRef>
+          <a:fontRef idx="minor">
+            <a:schemeClr val="lt1"/>
+          </a:fontRef>
+        </p:style>
+        <p:txBody>
+          <a:bodyPr rtlCol="0" anchor="ctr"/>
+          <a:lstStyle/>
+          <a:p>
+            <a:pPr algn="ctr"/>
+            <a:endParaRPr lang="en-US"/>
+          </a:p>
+        </p:txBody>
+      </p:sp>
+    </p:spTree>
+    <p:extLst>
+      <p:ext uri="{BB962C8B-B14F-4D97-AF65-F5344CB8AC3E}">
+        <p14:creationId xmlns:p14="http://schemas.microsoft.com/office/powerpoint/2010/main" val="3962812072"/>
+      </p:ext>
+    </p:extLst>
+  </p:cSld>
+  <p:clrMapOvr>
+    <a:masterClrMapping/>
+  </p:clrMapOvr>
+</p:sld>
+</file>
+
+<file path=ppt/slides/slide15.xml><?xml version="1.0" encoding="utf-8"?>
+<p:sld xmlns:a="http://schemas.openxmlformats.org/drawingml/2006/main" xmlns:r="http://schemas.openxmlformats.org/officeDocument/2006/relationships" xmlns:p="http://schemas.openxmlformats.org/presentationml/2006/main">
+  <p:cSld>
+    <p:spTree>
+      <p:nvGrpSpPr>
+        <p:cNvPr id="1" name=""/>
+        <p:cNvGrpSpPr/>
+        <p:nvPr/>
+      </p:nvGrpSpPr>
+      <p:grpSpPr>
+        <a:xfrm>
+          <a:off x="0" y="0"/>
+          <a:ext cx="0" cy="0"/>
+          <a:chOff x="0" y="0"/>
+          <a:chExt cx="0" cy="0"/>
+        </a:xfrm>
+      </p:grpSpPr>
+      <p:sp>
+        <p:nvSpPr>
+          <p:cNvPr id="2" name="Title 1">
+            <a:extLst>
+              <a:ext uri="{FF2B5EF4-FFF2-40B4-BE49-F238E27FC236}">
+                <a16:creationId xmlns:a16="http://schemas.microsoft.com/office/drawing/2014/main" id="{EBC10BD7-5751-98F3-BAC0-09B584294F13}"/>
+              </a:ext>
+            </a:extLst>
+          </p:cNvPr>
+          <p:cNvSpPr>
+            <a:spLocks noGrp="1"/>
+          </p:cNvSpPr>
+          <p:nvPr>
+            <p:ph type="title"/>
+          </p:nvPr>
+        </p:nvSpPr>
+        <p:spPr/>
+        <p:txBody>
+          <a:bodyPr/>
+          <a:lstStyle/>
+          <a:p>
+            <a:r>
+              <a:rPr lang="en-US" dirty="0"/>
+              <a:t>Enable Access 3</a:t>
+            </a:r>
+          </a:p>
+        </p:txBody>
+      </p:sp>
+      <p:sp>
+        <p:nvSpPr>
+          <p:cNvPr id="3" name="Content Placeholder 2">
+            <a:extLst>
+              <a:ext uri="{FF2B5EF4-FFF2-40B4-BE49-F238E27FC236}">
+                <a16:creationId xmlns:a16="http://schemas.microsoft.com/office/drawing/2014/main" id="{E07B74E5-702D-638C-1A9A-DD829AA355FC}"/>
+              </a:ext>
+            </a:extLst>
+          </p:cNvPr>
+          <p:cNvSpPr>
+            <a:spLocks noGrp="1"/>
+          </p:cNvSpPr>
+          <p:nvPr>
+            <p:ph idx="1"/>
+          </p:nvPr>
+        </p:nvSpPr>
+        <p:spPr>
+          <a:xfrm>
+            <a:off x="7212457" y="1825625"/>
+            <a:ext cx="4500081" cy="4351338"/>
+          </a:xfrm>
+        </p:spPr>
+        <p:txBody>
+          <a:bodyPr/>
+          <a:lstStyle/>
+          <a:p>
+            <a:r>
+              <a:rPr lang="en-US" dirty="0" err="1"/>
+              <a:t>跳出</a:t>
+            </a:r>
+            <a:r>
+              <a:rPr lang="zh-TW" altLang="en-US" dirty="0"/>
+              <a:t> </a:t>
+            </a:r>
+            <a:r>
+              <a:rPr lang="en-US" dirty="0"/>
+              <a:t>Edit Block public access (bucket settings)</a:t>
+            </a:r>
+            <a:r>
+              <a:rPr lang="zh-TW" altLang="en-US" dirty="0"/>
+              <a:t> 畫面，輸入</a:t>
+            </a:r>
+            <a:r>
+              <a:rPr lang="en-US" altLang="zh-TW" dirty="0"/>
+              <a:t> confirm</a:t>
+            </a:r>
+            <a:r>
+              <a:rPr lang="zh-TW" altLang="en-US" dirty="0"/>
+              <a:t>，在點擊 </a:t>
+            </a:r>
+            <a:r>
+              <a:rPr lang="en-US" altLang="zh-TW" dirty="0"/>
+              <a:t>Confirm</a:t>
+            </a:r>
+            <a:endParaRPr lang="en-US" dirty="0"/>
+          </a:p>
+          <a:p>
+            <a:endParaRPr lang="en-US" dirty="0"/>
+          </a:p>
+        </p:txBody>
+      </p:sp>
+      <p:pic>
+        <p:nvPicPr>
+          <p:cNvPr id="5" name="Picture 4">
+            <a:extLst>
+              <a:ext uri="{FF2B5EF4-FFF2-40B4-BE49-F238E27FC236}">
+                <a16:creationId xmlns:a16="http://schemas.microsoft.com/office/drawing/2014/main" id="{52C5965D-C6EF-9E68-CC67-E681A34FC3A1}"/>
+              </a:ext>
+            </a:extLst>
+          </p:cNvPr>
+          <p:cNvPicPr>
+            <a:picLocks noChangeAspect="1"/>
+          </p:cNvPicPr>
+          <p:nvPr/>
+        </p:nvPicPr>
+        <p:blipFill>
+          <a:blip r:embed="rId2"/>
+          <a:stretch>
+            <a:fillRect/>
+          </a:stretch>
+        </p:blipFill>
+        <p:spPr>
+          <a:xfrm>
+            <a:off x="749585" y="2217301"/>
+            <a:ext cx="6172200" cy="3403600"/>
+          </a:xfrm>
+          <a:prstGeom prst="rect">
+            <a:avLst/>
+          </a:prstGeom>
+        </p:spPr>
+      </p:pic>
+    </p:spTree>
+    <p:extLst>
+      <p:ext uri="{BB962C8B-B14F-4D97-AF65-F5344CB8AC3E}">
+        <p14:creationId xmlns:p14="http://schemas.microsoft.com/office/powerpoint/2010/main" val="489370150"/>
+      </p:ext>
+    </p:extLst>
+  </p:cSld>
+  <p:clrMapOvr>
+    <a:masterClrMapping/>
+  </p:clrMapOvr>
+</p:sld>
+</file>
+
+<file path=ppt/slides/slide16.xml><?xml version="1.0" encoding="utf-8"?>
+<p:sld xmlns:a="http://schemas.openxmlformats.org/drawingml/2006/main" xmlns:r="http://schemas.openxmlformats.org/officeDocument/2006/relationships" xmlns:p="http://schemas.openxmlformats.org/presentationml/2006/main">
+  <p:cSld>
+    <p:spTree>
+      <p:nvGrpSpPr>
+        <p:cNvPr id="1" name=""/>
+        <p:cNvGrpSpPr/>
+        <p:nvPr/>
+      </p:nvGrpSpPr>
+      <p:grpSpPr>
+        <a:xfrm>
+          <a:off x="0" y="0"/>
+          <a:ext cx="0" cy="0"/>
+          <a:chOff x="0" y="0"/>
+          <a:chExt cx="0" cy="0"/>
+        </a:xfrm>
+      </p:grpSpPr>
+      <p:sp>
+        <p:nvSpPr>
+          <p:cNvPr id="2" name="Title 1">
+            <a:extLst>
+              <a:ext uri="{FF2B5EF4-FFF2-40B4-BE49-F238E27FC236}">
+                <a16:creationId xmlns:a16="http://schemas.microsoft.com/office/drawing/2014/main" id="{2E1EE1F4-F746-677A-3598-D1BCD50FAB0B}"/>
+              </a:ext>
+            </a:extLst>
+          </p:cNvPr>
+          <p:cNvSpPr>
+            <a:spLocks noGrp="1"/>
+          </p:cNvSpPr>
+          <p:nvPr>
+            <p:ph type="title"/>
+          </p:nvPr>
+        </p:nvSpPr>
+        <p:spPr/>
+        <p:txBody>
+          <a:bodyPr/>
+          <a:lstStyle/>
+          <a:p>
+            <a:r>
+              <a:rPr lang="en-US" dirty="0"/>
+              <a:t>Enable Access 4</a:t>
+            </a:r>
+          </a:p>
+        </p:txBody>
+      </p:sp>
+      <p:sp>
+        <p:nvSpPr>
+          <p:cNvPr id="3" name="Content Placeholder 2">
+            <a:extLst>
+              <a:ext uri="{FF2B5EF4-FFF2-40B4-BE49-F238E27FC236}">
+                <a16:creationId xmlns:a16="http://schemas.microsoft.com/office/drawing/2014/main" id="{80073A72-B2DD-A5C8-B35C-094C12A59F6A}"/>
+              </a:ext>
+            </a:extLst>
+          </p:cNvPr>
+          <p:cNvSpPr>
+            <a:spLocks noGrp="1"/>
+          </p:cNvSpPr>
+          <p:nvPr>
+            <p:ph idx="1"/>
+          </p:nvPr>
+        </p:nvSpPr>
+        <p:spPr>
+          <a:xfrm>
+            <a:off x="6359702" y="1825625"/>
+            <a:ext cx="4994097" cy="4351338"/>
+          </a:xfrm>
+        </p:spPr>
+        <p:txBody>
+          <a:bodyPr/>
+          <a:lstStyle/>
+          <a:p>
+            <a:r>
+              <a:rPr lang="en-US" dirty="0" err="1"/>
+              <a:t>設定成功</a:t>
+            </a:r>
+            <a:endParaRPr lang="en-US" dirty="0"/>
+          </a:p>
+          <a:p>
+            <a:r>
+              <a:rPr lang="en-US" dirty="0">
+                <a:solidFill>
+                  <a:srgbClr val="FF0000"/>
+                </a:solidFill>
+              </a:rPr>
+              <a:t>Block all public access </a:t>
+            </a:r>
+            <a:r>
+              <a:rPr lang="zh-TW" altLang="en-US" dirty="0">
+                <a:solidFill>
+                  <a:srgbClr val="FF0000"/>
+                </a:solidFill>
+              </a:rPr>
+              <a:t>為</a:t>
+            </a:r>
+            <a:r>
+              <a:rPr lang="en-US" altLang="zh-TW" dirty="0">
+                <a:solidFill>
+                  <a:srgbClr val="FF0000"/>
+                </a:solidFill>
+              </a:rPr>
+              <a:t> off</a:t>
+            </a:r>
+            <a:r>
+              <a:rPr lang="zh-TW" altLang="en-US" dirty="0"/>
+              <a:t>，代表允許</a:t>
+            </a:r>
+            <a:r>
+              <a:rPr lang="en-US" altLang="zh-TW" dirty="0"/>
+              <a:t>public access</a:t>
+            </a:r>
+          </a:p>
+          <a:p>
+            <a:r>
+              <a:rPr lang="en-US" dirty="0" err="1"/>
+              <a:t>在下方的</a:t>
+            </a:r>
+            <a:r>
+              <a:rPr lang="en-US" dirty="0"/>
+              <a:t> bucket policy</a:t>
+            </a:r>
+            <a:r>
+              <a:rPr lang="zh-TW" altLang="en-US" dirty="0"/>
+              <a:t>，設定</a:t>
+            </a:r>
+            <a:r>
+              <a:rPr lang="en-US" altLang="zh-TW" dirty="0"/>
+              <a:t>bucket</a:t>
+            </a:r>
+            <a:r>
+              <a:rPr lang="zh-TW" altLang="en-US" dirty="0"/>
+              <a:t>存取</a:t>
+            </a:r>
+            <a:r>
+              <a:rPr lang="en-US" altLang="zh-TW" dirty="0"/>
+              <a:t>config</a:t>
+            </a:r>
+            <a:endParaRPr lang="en-US" dirty="0"/>
+          </a:p>
+        </p:txBody>
+      </p:sp>
+      <p:pic>
+        <p:nvPicPr>
+          <p:cNvPr id="4" name="Picture 3">
+            <a:extLst>
+              <a:ext uri="{FF2B5EF4-FFF2-40B4-BE49-F238E27FC236}">
+                <a16:creationId xmlns:a16="http://schemas.microsoft.com/office/drawing/2014/main" id="{63782759-5D59-0BDD-E60C-C1C6B40CF64E}"/>
+              </a:ext>
+            </a:extLst>
+          </p:cNvPr>
+          <p:cNvPicPr>
+            <a:picLocks noChangeAspect="1"/>
+          </p:cNvPicPr>
+          <p:nvPr/>
+        </p:nvPicPr>
+        <p:blipFill>
+          <a:blip r:embed="rId2"/>
+          <a:stretch>
+            <a:fillRect/>
+          </a:stretch>
+        </p:blipFill>
+        <p:spPr>
+          <a:xfrm>
+            <a:off x="838200" y="1825625"/>
+            <a:ext cx="5278282" cy="4659330"/>
+          </a:xfrm>
+          <a:prstGeom prst="rect">
+            <a:avLst/>
+          </a:prstGeom>
+        </p:spPr>
+      </p:pic>
+      <p:sp>
+        <p:nvSpPr>
+          <p:cNvPr id="5" name="Rectangle 4">
+            <a:extLst>
+              <a:ext uri="{FF2B5EF4-FFF2-40B4-BE49-F238E27FC236}">
+                <a16:creationId xmlns:a16="http://schemas.microsoft.com/office/drawing/2014/main" id="{2C19AF9B-4704-E2A6-8D04-E0B04FBDDA12}"/>
+              </a:ext>
+            </a:extLst>
+          </p:cNvPr>
+          <p:cNvSpPr/>
+          <p:nvPr/>
+        </p:nvSpPr>
+        <p:spPr>
+          <a:xfrm>
+            <a:off x="1160980" y="5640512"/>
+            <a:ext cx="1407559" cy="410967"/>
+          </a:xfrm>
+          <a:prstGeom prst="rect">
+            <a:avLst/>
+          </a:prstGeom>
+          <a:noFill/>
+          <a:ln>
+            <a:solidFill>
+              <a:srgbClr val="FF0000"/>
+            </a:solidFill>
+          </a:ln>
+        </p:spPr>
+        <p:style>
+          <a:lnRef idx="2">
+            <a:schemeClr val="accent1">
+              <a:shade val="15000"/>
+            </a:schemeClr>
+          </a:lnRef>
+          <a:fillRef idx="1">
+            <a:schemeClr val="accent1"/>
+          </a:fillRef>
+          <a:effectRef idx="0">
+            <a:schemeClr val="accent1"/>
+          </a:effectRef>
+          <a:fontRef idx="minor">
+            <a:schemeClr val="lt1"/>
+          </a:fontRef>
+        </p:style>
+        <p:txBody>
+          <a:bodyPr rtlCol="0" anchor="ctr"/>
+          <a:lstStyle/>
+          <a:p>
+            <a:pPr algn="ctr"/>
+            <a:endParaRPr lang="en-US"/>
+          </a:p>
+        </p:txBody>
+      </p:sp>
+    </p:spTree>
+    <p:extLst>
+      <p:ext uri="{BB962C8B-B14F-4D97-AF65-F5344CB8AC3E}">
+        <p14:creationId xmlns:p14="http://schemas.microsoft.com/office/powerpoint/2010/main" val="2042794966"/>
+      </p:ext>
+    </p:extLst>
+  </p:cSld>
+  <p:clrMapOvr>
+    <a:masterClrMapping/>
+  </p:clrMapOvr>
+</p:sld>
+</file>
+
+<file path=ppt/slides/slide17.xml><?xml version="1.0" encoding="utf-8"?>
+<p:sld xmlns:a="http://schemas.openxmlformats.org/drawingml/2006/main" xmlns:r="http://schemas.openxmlformats.org/officeDocument/2006/relationships" xmlns:p="http://schemas.openxmlformats.org/presentationml/2006/main">
+  <p:cSld>
+    <p:spTree>
+      <p:nvGrpSpPr>
+        <p:cNvPr id="1" name=""/>
+        <p:cNvGrpSpPr/>
+        <p:nvPr/>
+      </p:nvGrpSpPr>
+      <p:grpSpPr>
+        <a:xfrm>
+          <a:off x="0" y="0"/>
+          <a:ext cx="0" cy="0"/>
+          <a:chOff x="0" y="0"/>
+          <a:chExt cx="0" cy="0"/>
+        </a:xfrm>
+      </p:grpSpPr>
+      <p:sp>
+        <p:nvSpPr>
+          <p:cNvPr id="2" name="Title 1">
+            <a:extLst>
+              <a:ext uri="{FF2B5EF4-FFF2-40B4-BE49-F238E27FC236}">
+                <a16:creationId xmlns:a16="http://schemas.microsoft.com/office/drawing/2014/main" id="{F585BD47-2CF5-CE2A-F5C1-BE93D2D41584}"/>
+              </a:ext>
+            </a:extLst>
+          </p:cNvPr>
+          <p:cNvSpPr>
+            <a:spLocks noGrp="1"/>
+          </p:cNvSpPr>
+          <p:nvPr>
+            <p:ph type="title"/>
+          </p:nvPr>
+        </p:nvSpPr>
+        <p:spPr/>
+        <p:txBody>
+          <a:bodyPr/>
+          <a:lstStyle/>
+          <a:p>
+            <a:r>
+              <a:rPr lang="en-US" dirty="0"/>
+              <a:t>Enable Access 5</a:t>
+            </a:r>
+          </a:p>
+        </p:txBody>
+      </p:sp>
+      <p:sp>
+        <p:nvSpPr>
+          <p:cNvPr id="3" name="Content Placeholder 2">
+            <a:extLst>
+              <a:ext uri="{FF2B5EF4-FFF2-40B4-BE49-F238E27FC236}">
+                <a16:creationId xmlns:a16="http://schemas.microsoft.com/office/drawing/2014/main" id="{BB75BE71-F385-3357-0064-754D380FB0AC}"/>
+              </a:ext>
+            </a:extLst>
+          </p:cNvPr>
+          <p:cNvSpPr>
+            <a:spLocks noGrp="1"/>
+          </p:cNvSpPr>
+          <p:nvPr>
+            <p:ph idx="1"/>
+          </p:nvPr>
+        </p:nvSpPr>
+        <p:spPr>
+          <a:xfrm>
+            <a:off x="6010382" y="1690688"/>
+            <a:ext cx="5845996" cy="4576548"/>
+          </a:xfrm>
+        </p:spPr>
+        <p:txBody>
+          <a:bodyPr/>
+          <a:lstStyle/>
+          <a:p>
+            <a:r>
+              <a:rPr lang="en-US" dirty="0" err="1"/>
+              <a:t>設定</a:t>
+            </a:r>
+            <a:r>
+              <a:rPr lang="zh-TW" altLang="en-US" dirty="0"/>
+              <a:t> </a:t>
+            </a:r>
+            <a:r>
+              <a:rPr lang="en-US" altLang="zh-TW" dirty="0"/>
+              <a:t>Bucket Policy</a:t>
+            </a:r>
+          </a:p>
+          <a:p>
+            <a:pPr lvl="1"/>
+            <a:r>
+              <a:rPr lang="en-US" dirty="0"/>
+              <a:t>Effect: Allow / </a:t>
+            </a:r>
+            <a:r>
+              <a:rPr lang="en-US" dirty="0" err="1"/>
+              <a:t>不允許</a:t>
+            </a:r>
+            <a:endParaRPr lang="en-US" dirty="0"/>
+          </a:p>
+          <a:p>
+            <a:pPr lvl="1"/>
+            <a:r>
+              <a:rPr lang="en-US" dirty="0"/>
+              <a:t>Principal: </a:t>
+            </a:r>
+            <a:r>
+              <a:rPr lang="en-US" dirty="0" err="1"/>
+              <a:t>誰可以存取</a:t>
+            </a:r>
+            <a:r>
+              <a:rPr lang="zh-TW" altLang="en-US" dirty="0"/>
+              <a:t>，* 代表所有人均可存取</a:t>
+            </a:r>
+            <a:endParaRPr lang="en-GB" altLang="zh-TW" dirty="0"/>
+          </a:p>
+          <a:p>
+            <a:pPr lvl="1"/>
+            <a:r>
+              <a:rPr lang="en-US" altLang="zh-TW" dirty="0"/>
+              <a:t>Action:</a:t>
+            </a:r>
+            <a:r>
+              <a:rPr lang="zh-TW" altLang="en-US" dirty="0"/>
+              <a:t>可執行哪些</a:t>
+            </a:r>
+            <a:r>
+              <a:rPr lang="en-US" altLang="zh-TW" dirty="0"/>
+              <a:t>API</a:t>
+            </a:r>
+          </a:p>
+          <a:p>
+            <a:pPr lvl="1"/>
+            <a:r>
+              <a:rPr lang="en-US" dirty="0"/>
+              <a:t>Resource: </a:t>
+            </a:r>
+            <a:r>
+              <a:rPr lang="en-US" dirty="0" err="1"/>
+              <a:t>可對哪些resourc執行Action</a:t>
+            </a:r>
+            <a:r>
+              <a:rPr lang="zh-TW" altLang="en-US" dirty="0"/>
+              <a:t>，</a:t>
+            </a:r>
+            <a:r>
+              <a:rPr lang="en-US" altLang="zh-TW" dirty="0"/>
+              <a:t>bucket</a:t>
+            </a:r>
+            <a:r>
+              <a:rPr lang="zh-TW" altLang="en-US" dirty="0"/>
+              <a:t>記得後面家 </a:t>
+            </a:r>
+            <a:r>
+              <a:rPr lang="en-US" altLang="zh-TW" dirty="0"/>
+              <a:t>/</a:t>
+            </a:r>
+            <a:r>
+              <a:rPr lang="zh-TW" altLang="en-US"/>
+              <a:t>*</a:t>
+            </a:r>
+            <a:endParaRPr lang="en-US" dirty="0"/>
+          </a:p>
+        </p:txBody>
+      </p:sp>
+      <p:pic>
+        <p:nvPicPr>
+          <p:cNvPr id="5" name="Picture 4">
+            <a:extLst>
+              <a:ext uri="{FF2B5EF4-FFF2-40B4-BE49-F238E27FC236}">
+                <a16:creationId xmlns:a16="http://schemas.microsoft.com/office/drawing/2014/main" id="{3BB8FA7E-1B17-DADA-988E-E587BD530C60}"/>
+              </a:ext>
+            </a:extLst>
+          </p:cNvPr>
+          <p:cNvPicPr>
+            <a:picLocks noChangeAspect="1"/>
+          </p:cNvPicPr>
+          <p:nvPr/>
+        </p:nvPicPr>
+        <p:blipFill>
+          <a:blip r:embed="rId2"/>
+          <a:stretch>
+            <a:fillRect/>
+          </a:stretch>
+        </p:blipFill>
+        <p:spPr>
+          <a:xfrm>
+            <a:off x="838200" y="1690688"/>
+            <a:ext cx="4343400" cy="4635500"/>
+          </a:xfrm>
+          <a:prstGeom prst="rect">
+            <a:avLst/>
+          </a:prstGeom>
+        </p:spPr>
+      </p:pic>
+    </p:spTree>
+    <p:extLst>
+      <p:ext uri="{BB962C8B-B14F-4D97-AF65-F5344CB8AC3E}">
+        <p14:creationId xmlns:p14="http://schemas.microsoft.com/office/powerpoint/2010/main" val="258059518"/>
+      </p:ext>
+    </p:extLst>
+  </p:cSld>
+  <p:clrMapOvr>
+    <a:masterClrMapping/>
+  </p:clrMapOvr>
+</p:sld>
+</file>
+
 <file path=ppt/slides/slide2.xml><?xml version="1.0" encoding="utf-8"?>
 <p:sld xmlns:a="http://schemas.openxmlformats.org/drawingml/2006/main" xmlns:r="http://schemas.openxmlformats.org/officeDocument/2006/relationships" xmlns:p="http://schemas.openxmlformats.org/presentationml/2006/main">
   <p:cSld>
@@ -3486,7 +5531,13 @@
           <a:p>
             <a:r>
               <a:rPr lang="en-US" dirty="0"/>
-              <a:t>Insert Object</a:t>
+              <a:t>Upload Object</a:t>
+            </a:r>
+          </a:p>
+          <a:p>
+            <a:r>
+              <a:rPr lang="en-US" dirty="0"/>
+              <a:t>Enable Access</a:t>
             </a:r>
           </a:p>
         </p:txBody>
@@ -3629,6 +5680,15 @@
               <a:rPr lang="en-US" dirty="0"/>
               <a:t>Create Bucket</a:t>
             </a:r>
+            <a:r>
+              <a:rPr lang="zh-TW" altLang="en-US" dirty="0"/>
+              <a:t> </a:t>
+            </a:r>
+            <a:r>
+              <a:rPr lang="en-US" altLang="zh-TW" dirty="0"/>
+              <a:t>1</a:t>
+            </a:r>
+            <a:endParaRPr lang="en-US" dirty="0"/>
           </a:p>
         </p:txBody>
       </p:sp>
@@ -3706,10 +5766,22 @@
               <a:rPr lang="en-US" dirty="0" err="1">
                 <a:latin typeface="+mn-ea"/>
               </a:rPr>
-              <a:t>點擊右邊的Create</a:t>
+              <a:t>點擊右邊的</a:t>
+            </a:r>
+            <a:r>
+              <a:rPr lang="en-US" dirty="0" err="1">
+                <a:solidFill>
+                  <a:srgbClr val="FF0000"/>
+                </a:solidFill>
+                <a:latin typeface="+mn-ea"/>
+              </a:rPr>
+              <a:t>Create</a:t>
             </a:r>
             <a:r>
               <a:rPr lang="en-US" dirty="0">
+                <a:solidFill>
+                  <a:srgbClr val="FF0000"/>
+                </a:solidFill>
                 <a:latin typeface="+mn-ea"/>
               </a:rPr>
               <a:t> Bucket</a:t>
@@ -3854,6 +5926,15 @@
               <a:rPr lang="en-US" dirty="0"/>
               <a:t>Create Bucket</a:t>
             </a:r>
+            <a:r>
+              <a:rPr lang="zh-TW" altLang="en-US" dirty="0"/>
+              <a:t> </a:t>
+            </a:r>
+            <a:r>
+              <a:rPr lang="en-US" altLang="zh-TW" dirty="0"/>
+              <a:t>2</a:t>
+            </a:r>
+            <a:endParaRPr lang="en-US" dirty="0"/>
           </a:p>
         </p:txBody>
       </p:sp>
@@ -3951,6 +6032,758 @@
     <p:extLst>
       <p:ext uri="{BB962C8B-B14F-4D97-AF65-F5344CB8AC3E}">
         <p14:creationId xmlns:p14="http://schemas.microsoft.com/office/powerpoint/2010/main" val="879916760"/>
+      </p:ext>
+    </p:extLst>
+  </p:cSld>
+  <p:clrMapOvr>
+    <a:masterClrMapping/>
+  </p:clrMapOvr>
+</p:sld>
+</file>
+
+<file path=ppt/slides/slide6.xml><?xml version="1.0" encoding="utf-8"?>
+<p:sld xmlns:a="http://schemas.openxmlformats.org/drawingml/2006/main" xmlns:r="http://schemas.openxmlformats.org/officeDocument/2006/relationships" xmlns:p="http://schemas.openxmlformats.org/presentationml/2006/main">
+  <p:cSld>
+    <p:spTree>
+      <p:nvGrpSpPr>
+        <p:cNvPr id="1" name=""/>
+        <p:cNvGrpSpPr/>
+        <p:nvPr/>
+      </p:nvGrpSpPr>
+      <p:grpSpPr>
+        <a:xfrm>
+          <a:off x="0" y="0"/>
+          <a:ext cx="0" cy="0"/>
+          <a:chOff x="0" y="0"/>
+          <a:chExt cx="0" cy="0"/>
+        </a:xfrm>
+      </p:grpSpPr>
+      <p:sp>
+        <p:nvSpPr>
+          <p:cNvPr id="2" name="Title 1">
+            <a:extLst>
+              <a:ext uri="{FF2B5EF4-FFF2-40B4-BE49-F238E27FC236}">
+                <a16:creationId xmlns:a16="http://schemas.microsoft.com/office/drawing/2014/main" id="{69AE8A09-CAFA-369E-B721-C4809094B394}"/>
+              </a:ext>
+            </a:extLst>
+          </p:cNvPr>
+          <p:cNvSpPr>
+            <a:spLocks noGrp="1"/>
+          </p:cNvSpPr>
+          <p:nvPr>
+            <p:ph type="title"/>
+          </p:nvPr>
+        </p:nvSpPr>
+        <p:spPr/>
+        <p:txBody>
+          <a:bodyPr/>
+          <a:lstStyle/>
+          <a:p>
+            <a:r>
+              <a:rPr lang="en-US" dirty="0"/>
+              <a:t>Create Bucket 3</a:t>
+            </a:r>
+          </a:p>
+        </p:txBody>
+      </p:sp>
+      <p:sp>
+        <p:nvSpPr>
+          <p:cNvPr id="3" name="Content Placeholder 2">
+            <a:extLst>
+              <a:ext uri="{FF2B5EF4-FFF2-40B4-BE49-F238E27FC236}">
+                <a16:creationId xmlns:a16="http://schemas.microsoft.com/office/drawing/2014/main" id="{1A4E88BD-3959-4E19-9099-BD15B7595D9F}"/>
+              </a:ext>
+            </a:extLst>
+          </p:cNvPr>
+          <p:cNvSpPr>
+            <a:spLocks noGrp="1"/>
+          </p:cNvSpPr>
+          <p:nvPr>
+            <p:ph idx="1"/>
+          </p:nvPr>
+        </p:nvSpPr>
+        <p:spPr>
+          <a:xfrm>
+            <a:off x="7623425" y="1582922"/>
+            <a:ext cx="4150759" cy="5043909"/>
+          </a:xfrm>
+        </p:spPr>
+        <p:txBody>
+          <a:bodyPr/>
+          <a:lstStyle/>
+          <a:p>
+            <a:r>
+              <a:rPr lang="en-US" dirty="0" err="1"/>
+              <a:t>填寫</a:t>
+            </a:r>
+            <a:r>
+              <a:rPr lang="zh-TW" altLang="en-US" dirty="0"/>
+              <a:t> </a:t>
+            </a:r>
+            <a:r>
+              <a:rPr lang="en-US" altLang="zh-TW" dirty="0">
+                <a:solidFill>
+                  <a:srgbClr val="FF0000"/>
+                </a:solidFill>
+              </a:rPr>
+              <a:t>Bucket Name</a:t>
+            </a:r>
+          </a:p>
+          <a:p>
+            <a:r>
+              <a:rPr lang="en-US" dirty="0" err="1"/>
+              <a:t>其他設定基本可以default</a:t>
+            </a:r>
+            <a:endParaRPr lang="en-US" dirty="0"/>
+          </a:p>
+          <a:p>
+            <a:pPr lvl="1"/>
+            <a:r>
+              <a:rPr lang="en-US" dirty="0"/>
+              <a:t>Enable/Disable ACLs </a:t>
+            </a:r>
+          </a:p>
+          <a:p>
+            <a:pPr lvl="1"/>
+            <a:r>
+              <a:rPr lang="en-US" dirty="0"/>
+              <a:t>Block Public Access setting for this bucket</a:t>
+            </a:r>
+          </a:p>
+          <a:p>
+            <a:pPr lvl="1"/>
+            <a:r>
+              <a:rPr lang="en-US" dirty="0"/>
+              <a:t>Bucket Versioning</a:t>
+            </a:r>
+          </a:p>
+          <a:p>
+            <a:pPr lvl="1"/>
+            <a:r>
+              <a:rPr lang="en-US" dirty="0"/>
+              <a:t>Default Encryption</a:t>
+            </a:r>
+          </a:p>
+          <a:p>
+            <a:r>
+              <a:rPr lang="en-US" dirty="0" err="1"/>
+              <a:t>最後按確定</a:t>
+            </a:r>
+            <a:endParaRPr lang="en-US" dirty="0"/>
+          </a:p>
+        </p:txBody>
+      </p:sp>
+      <p:pic>
+        <p:nvPicPr>
+          <p:cNvPr id="4" name="Picture 3">
+            <a:extLst>
+              <a:ext uri="{FF2B5EF4-FFF2-40B4-BE49-F238E27FC236}">
+                <a16:creationId xmlns:a16="http://schemas.microsoft.com/office/drawing/2014/main" id="{04D1EAA8-A311-C28E-C41D-23CAD7213E09}"/>
+              </a:ext>
+            </a:extLst>
+          </p:cNvPr>
+          <p:cNvPicPr>
+            <a:picLocks noChangeAspect="1"/>
+          </p:cNvPicPr>
+          <p:nvPr/>
+        </p:nvPicPr>
+        <p:blipFill>
+          <a:blip r:embed="rId2"/>
+          <a:stretch>
+            <a:fillRect/>
+          </a:stretch>
+        </p:blipFill>
+        <p:spPr>
+          <a:xfrm>
+            <a:off x="191815" y="1582922"/>
+            <a:ext cx="7195304" cy="4836743"/>
+          </a:xfrm>
+          <a:prstGeom prst="rect">
+            <a:avLst/>
+          </a:prstGeom>
+        </p:spPr>
+      </p:pic>
+      <p:sp>
+        <p:nvSpPr>
+          <p:cNvPr id="7" name="Rectangle 6">
+            <a:extLst>
+              <a:ext uri="{FF2B5EF4-FFF2-40B4-BE49-F238E27FC236}">
+                <a16:creationId xmlns:a16="http://schemas.microsoft.com/office/drawing/2014/main" id="{1686D900-0E50-3B15-6643-1039F6C70DBF}"/>
+              </a:ext>
+            </a:extLst>
+          </p:cNvPr>
+          <p:cNvSpPr/>
+          <p:nvPr/>
+        </p:nvSpPr>
+        <p:spPr>
+          <a:xfrm>
+            <a:off x="657546" y="3881756"/>
+            <a:ext cx="3061699" cy="346841"/>
+          </a:xfrm>
+          <a:prstGeom prst="rect">
+            <a:avLst/>
+          </a:prstGeom>
+          <a:noFill/>
+          <a:ln>
+            <a:solidFill>
+              <a:srgbClr val="FF0000"/>
+            </a:solidFill>
+          </a:ln>
+        </p:spPr>
+        <p:style>
+          <a:lnRef idx="2">
+            <a:schemeClr val="accent1">
+              <a:shade val="15000"/>
+            </a:schemeClr>
+          </a:lnRef>
+          <a:fillRef idx="1">
+            <a:schemeClr val="accent1"/>
+          </a:fillRef>
+          <a:effectRef idx="0">
+            <a:schemeClr val="accent1"/>
+          </a:effectRef>
+          <a:fontRef idx="minor">
+            <a:schemeClr val="lt1"/>
+          </a:fontRef>
+        </p:style>
+        <p:txBody>
+          <a:bodyPr rtlCol="0" anchor="ctr"/>
+          <a:lstStyle/>
+          <a:p>
+            <a:pPr algn="ctr"/>
+            <a:endParaRPr lang="en-US"/>
+          </a:p>
+        </p:txBody>
+      </p:sp>
+    </p:spTree>
+    <p:extLst>
+      <p:ext uri="{BB962C8B-B14F-4D97-AF65-F5344CB8AC3E}">
+        <p14:creationId xmlns:p14="http://schemas.microsoft.com/office/powerpoint/2010/main" val="900598387"/>
+      </p:ext>
+    </p:extLst>
+  </p:cSld>
+  <p:clrMapOvr>
+    <a:masterClrMapping/>
+  </p:clrMapOvr>
+</p:sld>
+</file>
+
+<file path=ppt/slides/slide7.xml><?xml version="1.0" encoding="utf-8"?>
+<p:sld xmlns:a="http://schemas.openxmlformats.org/drawingml/2006/main" xmlns:r="http://schemas.openxmlformats.org/officeDocument/2006/relationships" xmlns:p="http://schemas.openxmlformats.org/presentationml/2006/main">
+  <p:cSld>
+    <p:spTree>
+      <p:nvGrpSpPr>
+        <p:cNvPr id="1" name=""/>
+        <p:cNvGrpSpPr/>
+        <p:nvPr/>
+      </p:nvGrpSpPr>
+      <p:grpSpPr>
+        <a:xfrm>
+          <a:off x="0" y="0"/>
+          <a:ext cx="0" cy="0"/>
+          <a:chOff x="0" y="0"/>
+          <a:chExt cx="0" cy="0"/>
+        </a:xfrm>
+      </p:grpSpPr>
+      <p:sp>
+        <p:nvSpPr>
+          <p:cNvPr id="2" name="Title 1">
+            <a:extLst>
+              <a:ext uri="{FF2B5EF4-FFF2-40B4-BE49-F238E27FC236}">
+                <a16:creationId xmlns:a16="http://schemas.microsoft.com/office/drawing/2014/main" id="{F621639E-24BD-A7AC-141B-DD530FD3888F}"/>
+              </a:ext>
+            </a:extLst>
+          </p:cNvPr>
+          <p:cNvSpPr>
+            <a:spLocks noGrp="1"/>
+          </p:cNvSpPr>
+          <p:nvPr>
+            <p:ph type="title"/>
+          </p:nvPr>
+        </p:nvSpPr>
+        <p:spPr/>
+        <p:txBody>
+          <a:bodyPr/>
+          <a:lstStyle/>
+          <a:p>
+            <a:r>
+              <a:rPr lang="en-US" dirty="0"/>
+              <a:t>Create Bucket 4</a:t>
+            </a:r>
+          </a:p>
+        </p:txBody>
+      </p:sp>
+      <p:sp>
+        <p:nvSpPr>
+          <p:cNvPr id="3" name="Content Placeholder 2">
+            <a:extLst>
+              <a:ext uri="{FF2B5EF4-FFF2-40B4-BE49-F238E27FC236}">
+                <a16:creationId xmlns:a16="http://schemas.microsoft.com/office/drawing/2014/main" id="{1CA5D9C9-1001-5CB9-47F3-9119A9ECE27C}"/>
+              </a:ext>
+            </a:extLst>
+          </p:cNvPr>
+          <p:cNvSpPr>
+            <a:spLocks noGrp="1"/>
+          </p:cNvSpPr>
+          <p:nvPr>
+            <p:ph idx="1"/>
+          </p:nvPr>
+        </p:nvSpPr>
+        <p:spPr>
+          <a:xfrm>
+            <a:off x="8157681" y="1825625"/>
+            <a:ext cx="3196119" cy="4351338"/>
+          </a:xfrm>
+        </p:spPr>
+        <p:txBody>
+          <a:bodyPr/>
+          <a:lstStyle/>
+          <a:p>
+            <a:r>
+              <a:rPr lang="en-US" dirty="0"/>
+              <a:t>Create </a:t>
+            </a:r>
+            <a:r>
+              <a:rPr lang="en-US" dirty="0" err="1"/>
+              <a:t>的</a:t>
+            </a:r>
+            <a:r>
+              <a:rPr lang="zh-TW" altLang="en-US" dirty="0"/>
+              <a:t> </a:t>
+            </a:r>
+            <a:r>
+              <a:rPr lang="en-US" altLang="zh-TW" dirty="0"/>
+              <a:t>Bucket </a:t>
+            </a:r>
+            <a:r>
+              <a:rPr lang="zh-TW" altLang="en-US" dirty="0"/>
+              <a:t>如紅框所示</a:t>
+            </a:r>
+            <a:endParaRPr lang="en-US" altLang="zh-TW" dirty="0"/>
+          </a:p>
+          <a:p>
+            <a:r>
+              <a:rPr lang="en-US" dirty="0" err="1"/>
+              <a:t>可點擊</a:t>
+            </a:r>
+            <a:r>
+              <a:rPr lang="en-US" dirty="0" err="1">
+                <a:solidFill>
+                  <a:srgbClr val="FF0000"/>
+                </a:solidFill>
+              </a:rPr>
+              <a:t>bucket</a:t>
+            </a:r>
+            <a:r>
+              <a:rPr lang="en-US" dirty="0">
+                <a:solidFill>
+                  <a:srgbClr val="FF0000"/>
+                </a:solidFill>
+              </a:rPr>
+              <a:t> name</a:t>
+            </a:r>
+            <a:r>
+              <a:rPr lang="zh-TW" altLang="en-US" dirty="0"/>
+              <a:t> 進入</a:t>
+            </a:r>
+            <a:r>
+              <a:rPr lang="en-US" altLang="zh-TW" dirty="0"/>
+              <a:t>bucket</a:t>
+            </a:r>
+            <a:r>
+              <a:rPr lang="zh-TW" altLang="en-US" dirty="0"/>
+              <a:t>的</a:t>
+            </a:r>
+            <a:r>
+              <a:rPr lang="en-US" altLang="zh-TW" dirty="0"/>
+              <a:t>panel</a:t>
+            </a:r>
+            <a:endParaRPr lang="en-US" dirty="0"/>
+          </a:p>
+        </p:txBody>
+      </p:sp>
+      <p:pic>
+        <p:nvPicPr>
+          <p:cNvPr id="4" name="Picture 3">
+            <a:extLst>
+              <a:ext uri="{FF2B5EF4-FFF2-40B4-BE49-F238E27FC236}">
+                <a16:creationId xmlns:a16="http://schemas.microsoft.com/office/drawing/2014/main" id="{77F965BB-2BBF-5A5E-7E5E-B076B2DAD08D}"/>
+              </a:ext>
+            </a:extLst>
+          </p:cNvPr>
+          <p:cNvPicPr>
+            <a:picLocks noChangeAspect="1"/>
+          </p:cNvPicPr>
+          <p:nvPr/>
+        </p:nvPicPr>
+        <p:blipFill>
+          <a:blip r:embed="rId2"/>
+          <a:stretch>
+            <a:fillRect/>
+          </a:stretch>
+        </p:blipFill>
+        <p:spPr>
+          <a:xfrm>
+            <a:off x="242299" y="1936072"/>
+            <a:ext cx="7772400" cy="4130444"/>
+          </a:xfrm>
+          <a:prstGeom prst="rect">
+            <a:avLst/>
+          </a:prstGeom>
+        </p:spPr>
+      </p:pic>
+      <p:sp>
+        <p:nvSpPr>
+          <p:cNvPr id="5" name="Rectangle 4">
+            <a:extLst>
+              <a:ext uri="{FF2B5EF4-FFF2-40B4-BE49-F238E27FC236}">
+                <a16:creationId xmlns:a16="http://schemas.microsoft.com/office/drawing/2014/main" id="{EB47FA11-DD81-C441-02D9-2C582810AD35}"/>
+              </a:ext>
+            </a:extLst>
+          </p:cNvPr>
+          <p:cNvSpPr/>
+          <p:nvPr/>
+        </p:nvSpPr>
+        <p:spPr>
+          <a:xfrm>
+            <a:off x="666108" y="4080022"/>
+            <a:ext cx="6924782" cy="574172"/>
+          </a:xfrm>
+          <a:prstGeom prst="rect">
+            <a:avLst/>
+          </a:prstGeom>
+          <a:noFill/>
+          <a:ln>
+            <a:solidFill>
+              <a:srgbClr val="FF0000"/>
+            </a:solidFill>
+          </a:ln>
+        </p:spPr>
+        <p:style>
+          <a:lnRef idx="2">
+            <a:schemeClr val="accent1">
+              <a:shade val="15000"/>
+            </a:schemeClr>
+          </a:lnRef>
+          <a:fillRef idx="1">
+            <a:schemeClr val="accent1"/>
+          </a:fillRef>
+          <a:effectRef idx="0">
+            <a:schemeClr val="accent1"/>
+          </a:effectRef>
+          <a:fontRef idx="minor">
+            <a:schemeClr val="lt1"/>
+          </a:fontRef>
+        </p:style>
+        <p:txBody>
+          <a:bodyPr rtlCol="0" anchor="ctr"/>
+          <a:lstStyle/>
+          <a:p>
+            <a:pPr algn="ctr"/>
+            <a:endParaRPr lang="en-US"/>
+          </a:p>
+        </p:txBody>
+      </p:sp>
+    </p:spTree>
+    <p:extLst>
+      <p:ext uri="{BB962C8B-B14F-4D97-AF65-F5344CB8AC3E}">
+        <p14:creationId xmlns:p14="http://schemas.microsoft.com/office/powerpoint/2010/main" val="1995622163"/>
+      </p:ext>
+    </p:extLst>
+  </p:cSld>
+  <p:clrMapOvr>
+    <a:masterClrMapping/>
+  </p:clrMapOvr>
+</p:sld>
+</file>
+
+<file path=ppt/slides/slide8.xml><?xml version="1.0" encoding="utf-8"?>
+<p:sld xmlns:a="http://schemas.openxmlformats.org/drawingml/2006/main" xmlns:r="http://schemas.openxmlformats.org/officeDocument/2006/relationships" xmlns:p="http://schemas.openxmlformats.org/presentationml/2006/main">
+  <p:cSld>
+    <p:spTree>
+      <p:nvGrpSpPr>
+        <p:cNvPr id="1" name=""/>
+        <p:cNvGrpSpPr/>
+        <p:nvPr/>
+      </p:nvGrpSpPr>
+      <p:grpSpPr>
+        <a:xfrm>
+          <a:off x="0" y="0"/>
+          <a:ext cx="0" cy="0"/>
+          <a:chOff x="0" y="0"/>
+          <a:chExt cx="0" cy="0"/>
+        </a:xfrm>
+      </p:grpSpPr>
+      <p:sp>
+        <p:nvSpPr>
+          <p:cNvPr id="2" name="Title 1">
+            <a:extLst>
+              <a:ext uri="{FF2B5EF4-FFF2-40B4-BE49-F238E27FC236}">
+                <a16:creationId xmlns:a16="http://schemas.microsoft.com/office/drawing/2014/main" id="{D87A8908-2FBB-0C0D-1B4F-82BC7CB4EB84}"/>
+              </a:ext>
+            </a:extLst>
+          </p:cNvPr>
+          <p:cNvSpPr>
+            <a:spLocks noGrp="1"/>
+          </p:cNvSpPr>
+          <p:nvPr>
+            <p:ph type="title"/>
+          </p:nvPr>
+        </p:nvSpPr>
+        <p:spPr/>
+        <p:txBody>
+          <a:bodyPr/>
+          <a:lstStyle/>
+          <a:p>
+            <a:r>
+              <a:rPr lang="en-US" dirty="0"/>
+              <a:t>Upload Object</a:t>
+            </a:r>
+          </a:p>
+        </p:txBody>
+      </p:sp>
+      <p:sp>
+        <p:nvSpPr>
+          <p:cNvPr id="3" name="Text Placeholder 2">
+            <a:extLst>
+              <a:ext uri="{FF2B5EF4-FFF2-40B4-BE49-F238E27FC236}">
+                <a16:creationId xmlns:a16="http://schemas.microsoft.com/office/drawing/2014/main" id="{C1F66DEB-1CCB-716A-3B7D-975007DF3AED}"/>
+              </a:ext>
+            </a:extLst>
+          </p:cNvPr>
+          <p:cNvSpPr>
+            <a:spLocks noGrp="1"/>
+          </p:cNvSpPr>
+          <p:nvPr>
+            <p:ph type="body" idx="1"/>
+          </p:nvPr>
+        </p:nvSpPr>
+        <p:spPr/>
+        <p:txBody>
+          <a:bodyPr/>
+          <a:lstStyle/>
+          <a:p>
+            <a:endParaRPr lang="en-US"/>
+          </a:p>
+        </p:txBody>
+      </p:sp>
+    </p:spTree>
+    <p:extLst>
+      <p:ext uri="{BB962C8B-B14F-4D97-AF65-F5344CB8AC3E}">
+        <p14:creationId xmlns:p14="http://schemas.microsoft.com/office/powerpoint/2010/main" val="1893508766"/>
+      </p:ext>
+    </p:extLst>
+  </p:cSld>
+  <p:clrMapOvr>
+    <a:masterClrMapping/>
+  </p:clrMapOvr>
+</p:sld>
+</file>
+
+<file path=ppt/slides/slide9.xml><?xml version="1.0" encoding="utf-8"?>
+<p:sld xmlns:a="http://schemas.openxmlformats.org/drawingml/2006/main" xmlns:r="http://schemas.openxmlformats.org/officeDocument/2006/relationships" xmlns:p="http://schemas.openxmlformats.org/presentationml/2006/main">
+  <p:cSld>
+    <p:spTree>
+      <p:nvGrpSpPr>
+        <p:cNvPr id="1" name=""/>
+        <p:cNvGrpSpPr/>
+        <p:nvPr/>
+      </p:nvGrpSpPr>
+      <p:grpSpPr>
+        <a:xfrm>
+          <a:off x="0" y="0"/>
+          <a:ext cx="0" cy="0"/>
+          <a:chOff x="0" y="0"/>
+          <a:chExt cx="0" cy="0"/>
+        </a:xfrm>
+      </p:grpSpPr>
+      <p:sp>
+        <p:nvSpPr>
+          <p:cNvPr id="2" name="Title 1">
+            <a:extLst>
+              <a:ext uri="{FF2B5EF4-FFF2-40B4-BE49-F238E27FC236}">
+                <a16:creationId xmlns:a16="http://schemas.microsoft.com/office/drawing/2014/main" id="{FF19A7CB-BFF8-FC9C-2373-F7902086E33C}"/>
+              </a:ext>
+            </a:extLst>
+          </p:cNvPr>
+          <p:cNvSpPr>
+            <a:spLocks noGrp="1"/>
+          </p:cNvSpPr>
+          <p:nvPr>
+            <p:ph type="title"/>
+          </p:nvPr>
+        </p:nvSpPr>
+        <p:spPr/>
+        <p:txBody>
+          <a:bodyPr/>
+          <a:lstStyle/>
+          <a:p>
+            <a:r>
+              <a:rPr lang="en-US" dirty="0"/>
+              <a:t>Upload Object 1</a:t>
+            </a:r>
+          </a:p>
+        </p:txBody>
+      </p:sp>
+      <p:sp>
+        <p:nvSpPr>
+          <p:cNvPr id="3" name="Content Placeholder 2">
+            <a:extLst>
+              <a:ext uri="{FF2B5EF4-FFF2-40B4-BE49-F238E27FC236}">
+                <a16:creationId xmlns:a16="http://schemas.microsoft.com/office/drawing/2014/main" id="{289A72CD-7FA6-1973-CEC3-D603DA87746B}"/>
+              </a:ext>
+            </a:extLst>
+          </p:cNvPr>
+          <p:cNvSpPr>
+            <a:spLocks noGrp="1"/>
+          </p:cNvSpPr>
+          <p:nvPr>
+            <p:ph idx="1"/>
+          </p:nvPr>
+        </p:nvSpPr>
+        <p:spPr>
+          <a:xfrm>
+            <a:off x="8013842" y="1825625"/>
+            <a:ext cx="3873358" cy="4351338"/>
+          </a:xfrm>
+        </p:spPr>
+        <p:txBody>
+          <a:bodyPr/>
+          <a:lstStyle/>
+          <a:p>
+            <a:r>
+              <a:rPr lang="en-US" dirty="0" err="1">
+                <a:latin typeface="+mn-ea"/>
+              </a:rPr>
+              <a:t>進入</a:t>
+            </a:r>
+            <a:r>
+              <a:rPr lang="zh-TW" altLang="en-US" dirty="0">
+                <a:latin typeface="+mn-ea"/>
+              </a:rPr>
+              <a:t> </a:t>
+            </a:r>
+            <a:r>
+              <a:rPr lang="en-US" altLang="zh-TW" dirty="0">
+                <a:latin typeface="+mn-ea"/>
+              </a:rPr>
+              <a:t>Bucket Panel – Object </a:t>
+            </a:r>
+          </a:p>
+          <a:p>
+            <a:r>
+              <a:rPr lang="zh-TW" altLang="en-US" dirty="0">
+                <a:latin typeface="+mn-ea"/>
+              </a:rPr>
+              <a:t>點擊右邊的 </a:t>
+            </a:r>
+            <a:r>
+              <a:rPr lang="en-US" altLang="zh-TW" dirty="0">
+                <a:solidFill>
+                  <a:srgbClr val="FF0000"/>
+                </a:solidFill>
+                <a:latin typeface="+mn-ea"/>
+              </a:rPr>
+              <a:t>upload</a:t>
+            </a:r>
+          </a:p>
+        </p:txBody>
+      </p:sp>
+      <p:pic>
+        <p:nvPicPr>
+          <p:cNvPr id="4" name="Picture 3">
+            <a:extLst>
+              <a:ext uri="{FF2B5EF4-FFF2-40B4-BE49-F238E27FC236}">
+                <a16:creationId xmlns:a16="http://schemas.microsoft.com/office/drawing/2014/main" id="{297DB98F-2A45-D235-FF78-D9DC215ED25A}"/>
+              </a:ext>
+            </a:extLst>
+          </p:cNvPr>
+          <p:cNvPicPr>
+            <a:picLocks noChangeAspect="1"/>
+          </p:cNvPicPr>
+          <p:nvPr/>
+        </p:nvPicPr>
+        <p:blipFill>
+          <a:blip r:embed="rId2"/>
+          <a:stretch>
+            <a:fillRect/>
+          </a:stretch>
+        </p:blipFill>
+        <p:spPr>
+          <a:xfrm>
+            <a:off x="93323" y="2075189"/>
+            <a:ext cx="7772400" cy="3852209"/>
+          </a:xfrm>
+          <a:prstGeom prst="rect">
+            <a:avLst/>
+          </a:prstGeom>
+          <a:ln>
+            <a:solidFill>
+              <a:srgbClr val="FF0000"/>
+            </a:solidFill>
+          </a:ln>
+        </p:spPr>
+      </p:pic>
+      <p:sp>
+        <p:nvSpPr>
+          <p:cNvPr id="9" name="Rectangle 8">
+            <a:extLst>
+              <a:ext uri="{FF2B5EF4-FFF2-40B4-BE49-F238E27FC236}">
+                <a16:creationId xmlns:a16="http://schemas.microsoft.com/office/drawing/2014/main" id="{9D6B19BC-05A0-7D68-661E-6460DF68661B}"/>
+              </a:ext>
+            </a:extLst>
+          </p:cNvPr>
+          <p:cNvSpPr/>
+          <p:nvPr/>
+        </p:nvSpPr>
+        <p:spPr>
+          <a:xfrm>
+            <a:off x="6904234" y="4089115"/>
+            <a:ext cx="832206" cy="339047"/>
+          </a:xfrm>
+          <a:prstGeom prst="rect">
+            <a:avLst/>
+          </a:prstGeom>
+          <a:noFill/>
+          <a:ln>
+            <a:solidFill>
+              <a:srgbClr val="FF0000"/>
+            </a:solidFill>
+          </a:ln>
+        </p:spPr>
+        <p:style>
+          <a:lnRef idx="2">
+            <a:schemeClr val="accent1">
+              <a:shade val="15000"/>
+            </a:schemeClr>
+          </a:lnRef>
+          <a:fillRef idx="1">
+            <a:schemeClr val="accent1"/>
+          </a:fillRef>
+          <a:effectRef idx="0">
+            <a:schemeClr val="accent1"/>
+          </a:effectRef>
+          <a:fontRef idx="minor">
+            <a:schemeClr val="lt1"/>
+          </a:fontRef>
+        </p:style>
+        <p:txBody>
+          <a:bodyPr rtlCol="0" anchor="ctr"/>
+          <a:lstStyle/>
+          <a:p>
+            <a:pPr algn="ctr"/>
+            <a:endParaRPr lang="en-US">
+              <a:solidFill>
+                <a:srgbClr val="FF0000"/>
+              </a:solidFill>
+            </a:endParaRPr>
+          </a:p>
+        </p:txBody>
+      </p:sp>
+    </p:spTree>
+    <p:extLst>
+      <p:ext uri="{BB962C8B-B14F-4D97-AF65-F5344CB8AC3E}">
+        <p14:creationId xmlns:p14="http://schemas.microsoft.com/office/powerpoint/2010/main" val="2685044467"/>
       </p:ext>
     </p:extLst>
   </p:cSld>

</xml_diff>